<commit_message>
updated presentation and links
</commit_message>
<xml_diff>
--- a/MT/Matlab.pptx
+++ b/MT/Matlab.pptx
@@ -298,7 +298,7 @@
             <a:fld id="{C15F28F4-7B23-4356-B9B2-4CE17234FFAD}" type="datetimeFigureOut">
               <a:rPr lang="en-US" smtClean="0"/>
               <a:pPr/>
-              <a:t>26.03.2017</a:t>
+              <a:t>02.04.2017</a:t>
             </a:fld>
             <a:endParaRPr lang="en-US" dirty="0"/>
           </a:p>
@@ -556,7 +556,7 @@
             <a:fld id="{635693BF-99C6-4686-80F7-1E28324EA339}" type="datetimeFigureOut">
               <a:rPr lang="en-US" smtClean="0"/>
               <a:pPr/>
-              <a:t>26.03.2017</a:t>
+              <a:t>02.04.2017</a:t>
             </a:fld>
             <a:endParaRPr lang="en-US" dirty="0"/>
           </a:p>
@@ -723,7 +723,7 @@
             <a:fld id="{635693BF-99C6-4686-80F7-1E28324EA339}" type="datetimeFigureOut">
               <a:rPr lang="en-US" smtClean="0"/>
               <a:pPr/>
-              <a:t>26.03.2017</a:t>
+              <a:t>02.04.2017</a:t>
             </a:fld>
             <a:endParaRPr lang="en-US" dirty="0"/>
           </a:p>
@@ -900,7 +900,7 @@
             <a:fld id="{635693BF-99C6-4686-80F7-1E28324EA339}" type="datetimeFigureOut">
               <a:rPr lang="en-US" smtClean="0"/>
               <a:pPr/>
-              <a:t>26.03.2017</a:t>
+              <a:t>02.04.2017</a:t>
             </a:fld>
             <a:endParaRPr lang="en-US" dirty="0"/>
           </a:p>
@@ -1332,7 +1332,7 @@
             <a:fld id="{635693BF-99C6-4686-80F7-1E28324EA339}" type="datetimeFigureOut">
               <a:rPr lang="en-US" smtClean="0"/>
               <a:pPr/>
-              <a:t>26.03.2017</a:t>
+              <a:t>02.04.2017</a:t>
             </a:fld>
             <a:endParaRPr lang="en-US" dirty="0"/>
           </a:p>
@@ -1598,7 +1598,7 @@
             <a:fld id="{635693BF-99C6-4686-80F7-1E28324EA339}" type="datetimeFigureOut">
               <a:rPr lang="en-US" smtClean="0"/>
               <a:pPr/>
-              <a:t>26.03.2017</a:t>
+              <a:t>02.04.2017</a:t>
             </a:fld>
             <a:endParaRPr lang="en-US" dirty="0"/>
           </a:p>
@@ -1978,7 +1978,7 @@
             <a:fld id="{635693BF-99C6-4686-80F7-1E28324EA339}" type="datetimeFigureOut">
               <a:rPr lang="en-US" smtClean="0"/>
               <a:pPr/>
-              <a:t>26.03.2017</a:t>
+              <a:t>02.04.2017</a:t>
             </a:fld>
             <a:endParaRPr lang="en-US" dirty="0"/>
           </a:p>
@@ -2130,7 +2130,7 @@
             <a:fld id="{635693BF-99C6-4686-80F7-1E28324EA339}" type="datetimeFigureOut">
               <a:rPr lang="en-US" smtClean="0"/>
               <a:pPr/>
-              <a:t>26.03.2017</a:t>
+              <a:t>02.04.2017</a:t>
             </a:fld>
             <a:endParaRPr lang="en-US" dirty="0"/>
           </a:p>
@@ -2222,7 +2222,7 @@
             <a:fld id="{635693BF-99C6-4686-80F7-1E28324EA339}" type="datetimeFigureOut">
               <a:rPr lang="en-US" smtClean="0"/>
               <a:pPr/>
-              <a:t>26.03.2017</a:t>
+              <a:t>02.04.2017</a:t>
             </a:fld>
             <a:endParaRPr lang="en-US" dirty="0"/>
           </a:p>
@@ -2485,7 +2485,7 @@
             <a:fld id="{635693BF-99C6-4686-80F7-1E28324EA339}" type="datetimeFigureOut">
               <a:rPr lang="en-US" smtClean="0"/>
               <a:pPr/>
-              <a:t>26.03.2017</a:t>
+              <a:t>02.04.2017</a:t>
             </a:fld>
             <a:endParaRPr lang="en-US" dirty="0"/>
           </a:p>
@@ -2775,7 +2775,7 @@
             <a:fld id="{635693BF-99C6-4686-80F7-1E28324EA339}" type="datetimeFigureOut">
               <a:rPr lang="en-US" smtClean="0"/>
               <a:pPr/>
-              <a:t>26.03.2017</a:t>
+              <a:t>02.04.2017</a:t>
             </a:fld>
             <a:endParaRPr lang="en-US" dirty="0"/>
           </a:p>
@@ -7230,7 +7230,7 @@
           <a:graphicData uri="http://schemas.openxmlformats.org/presentationml/2006/ole">
             <mc:AlternateContent xmlns:mc="http://schemas.openxmlformats.org/markup-compatibility/2006">
               <mc:Choice xmlns:v="urn:schemas-microsoft-com:vml" Requires="v">
-                <p:oleObj spid="_x0000_s3086" name="Equation" r:id="rId3" imgW="1536700" imgH="1143000" progId="Equation.DSMT4">
+                <p:oleObj spid="_x0000_s3090" name="Equation" r:id="rId3" imgW="1536700" imgH="1143000" progId="Equation.DSMT4">
                   <p:embed/>
                 </p:oleObj>
               </mc:Choice>
@@ -7732,7 +7732,7 @@
           <a:graphicData uri="http://schemas.openxmlformats.org/presentationml/2006/ole">
             <mc:AlternateContent xmlns:mc="http://schemas.openxmlformats.org/markup-compatibility/2006">
               <mc:Choice xmlns:v="urn:schemas-microsoft-com:vml" Requires="v">
-                <p:oleObj spid="_x0000_s22540" name="Equation" r:id="rId3" imgW="647700" imgH="457200" progId="Equation.DSMT4">
+                <p:oleObj spid="_x0000_s22544" name="Equation" r:id="rId3" imgW="647700" imgH="457200" progId="Equation.DSMT4">
                   <p:embed/>
                 </p:oleObj>
               </mc:Choice>
@@ -8228,7 +8228,7 @@
           <a:graphicData uri="http://schemas.openxmlformats.org/presentationml/2006/ole">
             <mc:AlternateContent xmlns:mc="http://schemas.openxmlformats.org/markup-compatibility/2006">
               <mc:Choice xmlns:v="urn:schemas-microsoft-com:vml" Requires="v">
-                <p:oleObj spid="_x0000_s20514" name="Equation" r:id="rId3" imgW="2298700" imgH="711200" progId="Equation.DSMT4">
+                <p:oleObj spid="_x0000_s20526" name="Equation" r:id="rId3" imgW="2298700" imgH="711200" progId="Equation.DSMT4">
                   <p:embed/>
                 </p:oleObj>
               </mc:Choice>
@@ -8298,7 +8298,7 @@
           <a:graphicData uri="http://schemas.openxmlformats.org/presentationml/2006/ole">
             <mc:AlternateContent xmlns:mc="http://schemas.openxmlformats.org/markup-compatibility/2006">
               <mc:Choice xmlns:v="urn:schemas-microsoft-com:vml" Requires="v">
-                <p:oleObj spid="_x0000_s20515" name="Equation" r:id="rId5" imgW="1435100" imgH="711200" progId="Equation.DSMT4">
+                <p:oleObj spid="_x0000_s20527" name="Equation" r:id="rId5" imgW="1435100" imgH="711200" progId="Equation.DSMT4">
                   <p:embed/>
                 </p:oleObj>
               </mc:Choice>
@@ -8368,7 +8368,7 @@
           <a:graphicData uri="http://schemas.openxmlformats.org/presentationml/2006/ole">
             <mc:AlternateContent xmlns:mc="http://schemas.openxmlformats.org/markup-compatibility/2006">
               <mc:Choice xmlns:v="urn:schemas-microsoft-com:vml" Requires="v">
-                <p:oleObj spid="_x0000_s20516" name="Equation" r:id="rId7" imgW="1943100" imgH="711200" progId="Equation.DSMT4">
+                <p:oleObj spid="_x0000_s20528" name="Equation" r:id="rId7" imgW="1943100" imgH="711200" progId="Equation.DSMT4">
                   <p:embed/>
                 </p:oleObj>
               </mc:Choice>
@@ -8926,21 +8926,7 @@
                 <a:latin typeface="Courier New" pitchFamily="49" charset="0"/>
                 <a:cs typeface="Courier New" pitchFamily="49" charset="0"/>
               </a:rPr>
-              <a:t>B </a:t>
-            </a:r>
-            <a:r>
-              <a:rPr lang="en-US" sz="1600" dirty="0" smtClean="0">
-                <a:latin typeface="Courier New" pitchFamily="49" charset="0"/>
-                <a:cs typeface="Courier New" pitchFamily="49" charset="0"/>
-              </a:rPr>
-              <a:t>/ </a:t>
-            </a:r>
-            <a:r>
-              <a:rPr lang="en-US" sz="1600" dirty="0" smtClean="0">
-                <a:latin typeface="Courier New" pitchFamily="49" charset="0"/>
-                <a:cs typeface="Courier New" pitchFamily="49" charset="0"/>
-              </a:rPr>
-              <a:t>A;</a:t>
+              <a:t>B / A;</a:t>
             </a:r>
             <a:endParaRPr lang="he-IL" sz="1800" dirty="0" smtClean="0"/>
           </a:p>
@@ -9569,7 +9555,7 @@
           <a:graphicData uri="http://schemas.openxmlformats.org/presentationml/2006/ole">
             <mc:AlternateContent xmlns:mc="http://schemas.openxmlformats.org/markup-compatibility/2006">
               <mc:Choice xmlns:v="urn:schemas-microsoft-com:vml" Requires="v">
-                <p:oleObj spid="_x0000_s18455" name="Equation" r:id="rId3" imgW="558558" imgH="177723" progId="Equation.DSMT4">
+                <p:oleObj spid="_x0000_s18463" name="Equation" r:id="rId3" imgW="558558" imgH="177723" progId="Equation.DSMT4">
                   <p:embed/>
                 </p:oleObj>
               </mc:Choice>
@@ -9639,7 +9625,7 @@
           <a:graphicData uri="http://schemas.openxmlformats.org/presentationml/2006/ole">
             <mc:AlternateContent xmlns:mc="http://schemas.openxmlformats.org/markup-compatibility/2006">
               <mc:Choice xmlns:v="urn:schemas-microsoft-com:vml" Requires="v">
-                <p:oleObj spid="_x0000_s18456" name="Equation" r:id="rId5" imgW="723586" imgH="203112" progId="Equation.DSMT4">
+                <p:oleObj spid="_x0000_s18464" name="Equation" r:id="rId5" imgW="723586" imgH="203112" progId="Equation.DSMT4">
                   <p:embed/>
                 </p:oleObj>
               </mc:Choice>
@@ -13185,11 +13171,7 @@
             </a:r>
             <a:r>
               <a:rPr lang="he-IL" dirty="0" smtClean="0"/>
-              <a:t> פעמים בכיוון </a:t>
-            </a:r>
-            <a:r>
-              <a:rPr lang="he-IL" dirty="0" smtClean="0"/>
-              <a:t>העמודות</a:t>
+              <a:t> פעמים בכיוון העמודות</a:t>
             </a:r>
             <a:endParaRPr lang="en-US" dirty="0"/>
           </a:p>
@@ -14194,7 +14176,7 @@
           <a:graphicData uri="http://schemas.openxmlformats.org/presentationml/2006/ole">
             <mc:AlternateContent xmlns:mc="http://schemas.openxmlformats.org/markup-compatibility/2006">
               <mc:Choice xmlns:v="urn:schemas-microsoft-com:vml" Requires="v">
-                <p:oleObj spid="_x0000_s53264" name="Equation" r:id="rId4" imgW="1397000" imgH="431800" progId="Equation.DSMT4">
+                <p:oleObj spid="_x0000_s53268" name="Equation" r:id="rId4" imgW="1397000" imgH="431800" progId="Equation.DSMT4">
                   <p:embed/>
                 </p:oleObj>
               </mc:Choice>
@@ -14647,7 +14629,7 @@
           <a:graphicData uri="http://schemas.openxmlformats.org/presentationml/2006/ole">
             <mc:AlternateContent xmlns:mc="http://schemas.openxmlformats.org/markup-compatibility/2006">
               <mc:Choice xmlns:v="urn:schemas-microsoft-com:vml" Requires="v">
-                <p:oleObj spid="_x0000_s55319" name="Equation" r:id="rId3" imgW="3009900" imgH="457200" progId="Equation.DSMT4">
+                <p:oleObj spid="_x0000_s55327" name="Equation" r:id="rId3" imgW="3009900" imgH="457200" progId="Equation.DSMT4">
                   <p:embed/>
                 </p:oleObj>
               </mc:Choice>
@@ -14717,7 +14699,7 @@
           <a:graphicData uri="http://schemas.openxmlformats.org/presentationml/2006/ole">
             <mc:AlternateContent xmlns:mc="http://schemas.openxmlformats.org/markup-compatibility/2006">
               <mc:Choice xmlns:v="urn:schemas-microsoft-com:vml" Requires="v">
-                <p:oleObj spid="_x0000_s55320" name="Equation" r:id="rId5" imgW="3302000" imgH="457200" progId="Equation.DSMT4">
+                <p:oleObj spid="_x0000_s55328" name="Equation" r:id="rId5" imgW="3302000" imgH="457200" progId="Equation.DSMT4">
                   <p:embed/>
                 </p:oleObj>
               </mc:Choice>
@@ -15190,7 +15172,7 @@
           <a:graphicData uri="http://schemas.openxmlformats.org/presentationml/2006/ole">
             <mc:AlternateContent xmlns:mc="http://schemas.openxmlformats.org/markup-compatibility/2006">
               <mc:Choice xmlns:v="urn:schemas-microsoft-com:vml" Requires="v">
-                <p:oleObj spid="_x0000_s64558" name="Equation" r:id="rId3" imgW="723586" imgH="241195" progId="Equation.DSMT4">
+                <p:oleObj spid="_x0000_s64574" name="Equation" r:id="rId3" imgW="723586" imgH="241195" progId="Equation.DSMT4">
                   <p:embed/>
                 </p:oleObj>
               </mc:Choice>
@@ -15260,7 +15242,7 @@
           <a:graphicData uri="http://schemas.openxmlformats.org/presentationml/2006/ole">
             <mc:AlternateContent xmlns:mc="http://schemas.openxmlformats.org/markup-compatibility/2006">
               <mc:Choice xmlns:v="urn:schemas-microsoft-com:vml" Requires="v">
-                <p:oleObj spid="_x0000_s64559" name="Equation" r:id="rId5" imgW="1002865" imgH="799753" progId="Equation.DSMT4">
+                <p:oleObj spid="_x0000_s64575" name="Equation" r:id="rId5" imgW="1002865" imgH="799753" progId="Equation.DSMT4">
                   <p:embed/>
                 </p:oleObj>
               </mc:Choice>
@@ -15330,7 +15312,7 @@
           <a:graphicData uri="http://schemas.openxmlformats.org/presentationml/2006/ole">
             <mc:AlternateContent xmlns:mc="http://schemas.openxmlformats.org/markup-compatibility/2006">
               <mc:Choice xmlns:v="urn:schemas-microsoft-com:vml" Requires="v">
-                <p:oleObj spid="_x0000_s64560" name="Equation" r:id="rId7" imgW="825500" imgH="457200" progId="Equation.DSMT4">
+                <p:oleObj spid="_x0000_s64576" name="Equation" r:id="rId7" imgW="825500" imgH="457200" progId="Equation.DSMT4">
                   <p:embed/>
                 </p:oleObj>
               </mc:Choice>
@@ -15400,7 +15382,7 @@
           <a:graphicData uri="http://schemas.openxmlformats.org/presentationml/2006/ole">
             <mc:AlternateContent xmlns:mc="http://schemas.openxmlformats.org/markup-compatibility/2006">
               <mc:Choice xmlns:v="urn:schemas-microsoft-com:vml" Requires="v">
-                <p:oleObj spid="_x0000_s64561" name="Equation" r:id="rId9" imgW="1307532" imgH="634725" progId="Equation.DSMT4">
+                <p:oleObj spid="_x0000_s64577" name="Equation" r:id="rId9" imgW="1307532" imgH="634725" progId="Equation.DSMT4">
                   <p:embed/>
                 </p:oleObj>
               </mc:Choice>
@@ -15608,7 +15590,7 @@
           <a:graphicData uri="http://schemas.openxmlformats.org/presentationml/2006/ole">
             <mc:AlternateContent xmlns:mc="http://schemas.openxmlformats.org/markup-compatibility/2006">
               <mc:Choice xmlns:v="urn:schemas-microsoft-com:vml" Requires="v">
-                <p:oleObj spid="_x0000_s65560" name="Equation" r:id="rId3" imgW="2235200" imgH="482600" progId="Equation.DSMT4">
+                <p:oleObj spid="_x0000_s65568" name="Equation" r:id="rId3" imgW="2235200" imgH="482600" progId="Equation.DSMT4">
                   <p:embed/>
                 </p:oleObj>
               </mc:Choice>
@@ -15678,7 +15660,7 @@
           <a:graphicData uri="http://schemas.openxmlformats.org/presentationml/2006/ole">
             <mc:AlternateContent xmlns:mc="http://schemas.openxmlformats.org/markup-compatibility/2006">
               <mc:Choice xmlns:v="urn:schemas-microsoft-com:vml" Requires="v">
-                <p:oleObj spid="_x0000_s65561" name="Equation" r:id="rId5" imgW="2552700" imgH="736600" progId="Equation.DSMT4">
+                <p:oleObj spid="_x0000_s65569" name="Equation" r:id="rId5" imgW="2552700" imgH="736600" progId="Equation.DSMT4">
                   <p:embed/>
                 </p:oleObj>
               </mc:Choice>
@@ -16378,7 +16360,7 @@
           <a:graphicData uri="http://schemas.openxmlformats.org/presentationml/2006/ole">
             <mc:AlternateContent xmlns:mc="http://schemas.openxmlformats.org/markup-compatibility/2006">
               <mc:Choice xmlns:v="urn:schemas-microsoft-com:vml" Requires="v">
-                <p:oleObj spid="_x0000_s67597" name="Equation" r:id="rId3" imgW="2286000" imgH="482600" progId="Equation.DSMT4">
+                <p:oleObj spid="_x0000_s67601" name="Equation" r:id="rId3" imgW="2286000" imgH="482600" progId="Equation.DSMT4">
                   <p:embed/>
                 </p:oleObj>
               </mc:Choice>
@@ -17623,7 +17605,21 @@
                 <a:latin typeface="Courier New" pitchFamily="49" charset="0"/>
                 <a:cs typeface="Courier New" pitchFamily="49" charset="0"/>
               </a:rPr>
-              <a:t>&gt;&gt;myString = ‘Hello World’</a:t>
+              <a:t>&gt;&gt;myString = </a:t>
+            </a:r>
+            <a:r>
+              <a:rPr lang="en-US" sz="1800" dirty="0">
+                <a:latin typeface="Courier New" pitchFamily="49" charset="0"/>
+                <a:cs typeface="Courier New" pitchFamily="49" charset="0"/>
+              </a:rPr>
+              <a:t>'Hello World</a:t>
+            </a:r>
+            <a:r>
+              <a:rPr lang="en-US" sz="1800" dirty="0" smtClean="0">
+                <a:latin typeface="Courier New" pitchFamily="49" charset="0"/>
+                <a:cs typeface="Courier New" pitchFamily="49" charset="0"/>
+              </a:rPr>
+              <a:t>'</a:t>
             </a:r>
             <a:endParaRPr lang="he-IL" sz="1800" dirty="0" smtClean="0">
               <a:latin typeface="Courier New" pitchFamily="49" charset="0"/>
@@ -17692,27 +17688,67 @@
             </a:r>
             <a:r>
               <a:rPr lang="he-IL" sz="2000" dirty="0" smtClean="0"/>
-              <a:t>:                                                         </a:t>
+              <a:t>:  </a:t>
+            </a:r>
+            <a:r>
+              <a:rPr lang="he-IL" sz="2000" dirty="0" smtClean="0"/>
+              <a:t>                             </a:t>
+            </a:r>
+            <a:r>
+              <a:rPr lang="en-US" sz="2000" dirty="0" smtClean="0"/>
+              <a:t>  </a:t>
+            </a:r>
+            <a:r>
+              <a:rPr lang="he-IL" sz="2000" dirty="0" smtClean="0"/>
+              <a:t>                        </a:t>
             </a:r>
             <a:r>
               <a:rPr lang="en-US" sz="1800" dirty="0" smtClean="0">
                 <a:latin typeface="Courier New" pitchFamily="49" charset="0"/>
                 <a:cs typeface="Courier New" pitchFamily="49" charset="0"/>
               </a:rPr>
-              <a:t>&gt;&gt; x=char(65) -&gt; x=‘A’</a:t>
-            </a:r>
-            <a:endParaRPr lang="he-IL" sz="2000" dirty="0" smtClean="0"/>
-          </a:p>
-          <a:p>
-            <a:r>
-              <a:rPr lang="he-IL" sz="2000" dirty="0" smtClean="0"/>
-              <a:t>המרה של מספר למחרוזת      </a:t>
+              <a:t>&gt;&gt; x=char(65) -&gt; x</a:t>
+            </a:r>
+            <a:r>
+              <a:rPr lang="en-US" sz="1800" dirty="0">
+                <a:latin typeface="Courier New" pitchFamily="49" charset="0"/>
+                <a:cs typeface="Courier New" pitchFamily="49" charset="0"/>
+              </a:rPr>
+              <a:t>=</a:t>
             </a:r>
             <a:r>
               <a:rPr lang="en-US" sz="1800" dirty="0" smtClean="0">
                 <a:latin typeface="Courier New" pitchFamily="49" charset="0"/>
                 <a:cs typeface="Courier New" pitchFamily="49" charset="0"/>
               </a:rPr>
+              <a:t>'A</a:t>
+            </a:r>
+            <a:r>
+              <a:rPr lang="en-US" sz="1800" dirty="0">
+                <a:latin typeface="Courier New" pitchFamily="49" charset="0"/>
+                <a:cs typeface="Courier New" pitchFamily="49" charset="0"/>
+              </a:rPr>
+              <a:t>' </a:t>
+            </a:r>
+            <a:endParaRPr lang="en-US" sz="1800" dirty="0" smtClean="0">
+              <a:latin typeface="Courier New" pitchFamily="49" charset="0"/>
+              <a:cs typeface="Courier New" pitchFamily="49" charset="0"/>
+            </a:endParaRPr>
+          </a:p>
+          <a:p>
+            <a:r>
+              <a:rPr lang="he-IL" sz="2000" dirty="0" smtClean="0"/>
+              <a:t>המרה </a:t>
+            </a:r>
+            <a:r>
+              <a:rPr lang="he-IL" sz="2000" dirty="0" smtClean="0"/>
+              <a:t>של מספר למחרוזת      </a:t>
+            </a:r>
+            <a:r>
+              <a:rPr lang="en-US" sz="1800" dirty="0" smtClean="0">
+                <a:latin typeface="Courier New" pitchFamily="49" charset="0"/>
+                <a:cs typeface="Courier New" pitchFamily="49" charset="0"/>
+              </a:rPr>
               <a:t>num2str(109)</a:t>
             </a:r>
             <a:r>
@@ -17734,11 +17770,18 @@
               <a:t> </a:t>
             </a:r>
             <a:r>
+              <a:rPr lang="en-US" sz="1800" dirty="0">
+                <a:latin typeface="Courier New" pitchFamily="49" charset="0"/>
+                <a:cs typeface="Courier New" pitchFamily="49" charset="0"/>
+              </a:rPr>
+              <a:t>str2num(</a:t>
+            </a:r>
+            <a:r>
               <a:rPr lang="en-US" sz="1800" dirty="0" smtClean="0">
                 <a:latin typeface="Courier New" pitchFamily="49" charset="0"/>
                 <a:cs typeface="Courier New" pitchFamily="49" charset="0"/>
               </a:rPr>
-              <a:t>str2num(‘109’)</a:t>
+              <a:t>'109')</a:t>
             </a:r>
             <a:endParaRPr lang="he-IL" sz="2000" dirty="0" smtClean="0">
               <a:latin typeface="Courier New" pitchFamily="49" charset="0"/>
@@ -17789,8 +17832,33 @@
                 <a:latin typeface="Courier New" pitchFamily="49" charset="0"/>
                 <a:cs typeface="Courier New" pitchFamily="49" charset="0"/>
               </a:rPr>
-              <a:t> ‘dlroW olleH’</a:t>
-            </a:r>
+              <a:t> </a:t>
+            </a:r>
+            <a:r>
+              <a:rPr lang="en-US" sz="2000" dirty="0" smtClean="0">
+                <a:latin typeface="Courier New" pitchFamily="49" charset="0"/>
+                <a:cs typeface="Courier New" pitchFamily="49" charset="0"/>
+              </a:rPr>
+              <a:t>'</a:t>
+            </a:r>
+            <a:r>
+              <a:rPr lang="en-US" sz="2000" dirty="0" smtClean="0">
+                <a:latin typeface="Courier New" pitchFamily="49" charset="0"/>
+                <a:cs typeface="Courier New" pitchFamily="49" charset="0"/>
+              </a:rPr>
+              <a:t>dlroW</a:t>
+            </a:r>
+            <a:r>
+              <a:rPr lang="en-US" sz="2000" dirty="0">
+                <a:latin typeface="Courier New" pitchFamily="49" charset="0"/>
+                <a:cs typeface="Courier New" pitchFamily="49" charset="0"/>
+              </a:rPr>
+              <a:t> olleH'</a:t>
+            </a:r>
+            <a:endParaRPr lang="en-US" sz="2000" dirty="0" smtClean="0">
+              <a:latin typeface="Courier New" pitchFamily="49" charset="0"/>
+              <a:cs typeface="Courier New" pitchFamily="49" charset="0"/>
+            </a:endParaRPr>
           </a:p>
           <a:p>
             <a:pPr algn="l" rtl="0">
@@ -17906,7 +17974,21 @@
                 <a:latin typeface="Courier New" pitchFamily="49" charset="0"/>
                 <a:cs typeface="Courier New" pitchFamily="49" charset="0"/>
               </a:rPr>
-              <a:t>&gt;&gt;matString = strvcat(matString,‘Hi World’)</a:t>
+              <a:t>&gt;&gt;matString = strvcat(matString</a:t>
+            </a:r>
+            <a:r>
+              <a:rPr lang="en-US" sz="1800" dirty="0" smtClean="0">
+                <a:latin typeface="Courier New" pitchFamily="49" charset="0"/>
+                <a:cs typeface="Courier New" pitchFamily="49" charset="0"/>
+              </a:rPr>
+              <a:t>,'</a:t>
+            </a:r>
+            <a:r>
+              <a:rPr lang="en-US" sz="1800" dirty="0">
+                <a:latin typeface="Courier New" pitchFamily="49" charset="0"/>
+                <a:cs typeface="Courier New" pitchFamily="49" charset="0"/>
+              </a:rPr>
+              <a:t>Hi World')</a:t>
             </a:r>
             <a:endParaRPr lang="he-IL" sz="1800" dirty="0" smtClean="0"/>
           </a:p>
@@ -19310,7 +19392,28 @@
                 <a:latin typeface="Courier New" pitchFamily="49" charset="0"/>
                 <a:cs typeface="Courier New" pitchFamily="49" charset="0"/>
               </a:rPr>
-              <a:t>&gt;&gt; cellfun(’length’,A) </a:t>
+              <a:t>&gt;&gt; cellfun</a:t>
+            </a:r>
+            <a:r>
+              <a:rPr lang="en-US" sz="1600" dirty="0">
+                <a:latin typeface="Courier New" pitchFamily="49" charset="0"/>
+                <a:cs typeface="Courier New" pitchFamily="49" charset="0"/>
+              </a:rPr>
+              <a:t>(</a:t>
+            </a:r>
+            <a:r>
+              <a:rPr lang="en-US" sz="1600" dirty="0" smtClean="0">
+                <a:latin typeface="Courier New" pitchFamily="49" charset="0"/>
+                <a:cs typeface="Courier New" pitchFamily="49" charset="0"/>
+              </a:rPr>
+              <a:t>'length',</a:t>
+            </a:r>
+            <a:r>
+              <a:rPr lang="en-US" sz="1600" dirty="0" smtClean="0">
+                <a:latin typeface="Courier New" pitchFamily="49" charset="0"/>
+                <a:cs typeface="Courier New" pitchFamily="49" charset="0"/>
+              </a:rPr>
+              <a:t>A) </a:t>
             </a:r>
             <a:r>
               <a:rPr lang="en-US" sz="1600" dirty="0" smtClean="0">
@@ -19445,14 +19548,14 @@
             </a:pPr>
             <a:r>
               <a:rPr lang="en-US" sz="2000" dirty="0" smtClean="0">
-                <a:latin typeface="David" pitchFamily="34" charset="-79"/>
-                <a:cs typeface="David" pitchFamily="34" charset="-79"/>
+                <a:latin typeface="Courier New" pitchFamily="49" charset="0"/>
+                <a:cs typeface="Courier New" pitchFamily="49" charset="0"/>
               </a:rPr>
               <a:t>cell2mat(C)</a:t>
             </a:r>
             <a:endParaRPr lang="he-IL" sz="2000" dirty="0" smtClean="0">
-              <a:latin typeface="David" pitchFamily="34" charset="-79"/>
-              <a:cs typeface="David" pitchFamily="34" charset="-79"/>
+              <a:latin typeface="Courier New" pitchFamily="49" charset="0"/>
+              <a:cs typeface="Courier New" pitchFamily="49" charset="0"/>
             </a:endParaRPr>
           </a:p>
           <a:p>
@@ -19469,15 +19572,15 @@
               <a:defRPr/>
             </a:pPr>
             <a:r>
-              <a:rPr lang="en-US" sz="2000" dirty="0" smtClean="0">
-                <a:latin typeface="David" pitchFamily="34" charset="-79"/>
-                <a:cs typeface="David" pitchFamily="34" charset="-79"/>
+              <a:rPr lang="en-US" sz="2000" dirty="0">
+                <a:latin typeface="Courier New" pitchFamily="49" charset="0"/>
+                <a:cs typeface="Courier New" pitchFamily="49" charset="0"/>
               </a:rPr>
               <a:t>celldisp(C)</a:t>
             </a:r>
-            <a:endParaRPr lang="he-IL" sz="2000" dirty="0" smtClean="0">
-              <a:latin typeface="David" pitchFamily="34" charset="-79"/>
-              <a:cs typeface="David" pitchFamily="34" charset="-79"/>
+            <a:endParaRPr lang="he-IL" sz="2000" dirty="0">
+              <a:latin typeface="Courier New" pitchFamily="49" charset="0"/>
+              <a:cs typeface="Courier New" pitchFamily="49" charset="0"/>
             </a:endParaRPr>
           </a:p>
           <a:p>
@@ -19494,15 +19597,15 @@
               <a:defRPr/>
             </a:pPr>
             <a:r>
-              <a:rPr lang="en-US" sz="2000" dirty="0" smtClean="0">
-                <a:latin typeface="David" pitchFamily="34" charset="-79"/>
-                <a:cs typeface="David" pitchFamily="34" charset="-79"/>
+              <a:rPr lang="en-US" sz="2000" dirty="0">
+                <a:latin typeface="Courier New" pitchFamily="49" charset="0"/>
+                <a:cs typeface="Courier New" pitchFamily="49" charset="0"/>
               </a:rPr>
               <a:t>cellplot(C)</a:t>
             </a:r>
-            <a:endParaRPr lang="he-IL" sz="2000" dirty="0" smtClean="0">
-              <a:latin typeface="David" pitchFamily="34" charset="-79"/>
-              <a:cs typeface="David" pitchFamily="34" charset="-79"/>
+            <a:endParaRPr lang="he-IL" sz="2000" dirty="0">
+              <a:latin typeface="Courier New" pitchFamily="49" charset="0"/>
+              <a:cs typeface="Courier New" pitchFamily="49" charset="0"/>
             </a:endParaRPr>
           </a:p>
           <a:p>
@@ -20314,7 +20417,91 @@
                 <a:latin typeface="Courier New" pitchFamily="49" charset="0"/>
                 <a:cs typeface="Courier New" pitchFamily="49" charset="0"/>
               </a:rPr>
-              <a:t>&gt;&gt;StrArray = struct(’field1’,{values1},’field2’,{values2},…)</a:t>
+              <a:t>&gt;&gt;StrArray = struct</a:t>
+            </a:r>
+            <a:r>
+              <a:rPr lang="en-US" sz="1700" dirty="0" smtClean="0">
+                <a:latin typeface="Courier New" pitchFamily="49" charset="0"/>
+                <a:cs typeface="Courier New" pitchFamily="49" charset="0"/>
+              </a:rPr>
+              <a:t>(</a:t>
+            </a:r>
+            <a:r>
+              <a:rPr lang="en-US" sz="1800" dirty="0" smtClean="0">
+                <a:latin typeface="Courier New" pitchFamily="49" charset="0"/>
+                <a:cs typeface="Courier New" pitchFamily="49" charset="0"/>
+              </a:rPr>
+              <a:t>'</a:t>
+            </a:r>
+            <a:r>
+              <a:rPr lang="en-US" sz="1700" dirty="0" smtClean="0">
+                <a:latin typeface="Courier New" pitchFamily="49" charset="0"/>
+                <a:cs typeface="Courier New" pitchFamily="49" charset="0"/>
+              </a:rPr>
+              <a:t>field1</a:t>
+            </a:r>
+            <a:r>
+              <a:rPr lang="en-US" sz="1800" dirty="0" smtClean="0">
+                <a:latin typeface="Courier New" pitchFamily="49" charset="0"/>
+                <a:cs typeface="Courier New" pitchFamily="49" charset="0"/>
+              </a:rPr>
+              <a:t>'</a:t>
+            </a:r>
+            <a:r>
+              <a:rPr lang="en-US" sz="1700" dirty="0" smtClean="0">
+                <a:latin typeface="Courier New" pitchFamily="49" charset="0"/>
+                <a:cs typeface="Courier New" pitchFamily="49" charset="0"/>
+              </a:rPr>
+              <a:t>,{</a:t>
+            </a:r>
+            <a:r>
+              <a:rPr lang="en-US" sz="1700" dirty="0" smtClean="0">
+                <a:latin typeface="Courier New" pitchFamily="49" charset="0"/>
+                <a:cs typeface="Courier New" pitchFamily="49" charset="0"/>
+              </a:rPr>
+              <a:t>values1</a:t>
+            </a:r>
+            <a:r>
+              <a:rPr lang="en-US" sz="1700" dirty="0" smtClean="0">
+                <a:latin typeface="Courier New" pitchFamily="49" charset="0"/>
+                <a:cs typeface="Courier New" pitchFamily="49" charset="0"/>
+              </a:rPr>
+              <a:t>},</a:t>
+            </a:r>
+            <a:r>
+              <a:rPr lang="en-US" sz="1800" dirty="0" smtClean="0">
+                <a:latin typeface="Courier New" pitchFamily="49" charset="0"/>
+                <a:cs typeface="Courier New" pitchFamily="49" charset="0"/>
+              </a:rPr>
+              <a:t>'</a:t>
+            </a:r>
+            <a:r>
+              <a:rPr lang="en-US" sz="1700" dirty="0" smtClean="0">
+                <a:latin typeface="Courier New" pitchFamily="49" charset="0"/>
+                <a:cs typeface="Courier New" pitchFamily="49" charset="0"/>
+              </a:rPr>
+              <a:t>field2</a:t>
+            </a:r>
+            <a:r>
+              <a:rPr lang="en-US" sz="1800" dirty="0" smtClean="0">
+                <a:latin typeface="Courier New" pitchFamily="49" charset="0"/>
+                <a:cs typeface="Courier New" pitchFamily="49" charset="0"/>
+              </a:rPr>
+              <a:t>'</a:t>
+            </a:r>
+            <a:r>
+              <a:rPr lang="en-US" sz="1700" dirty="0" smtClean="0">
+                <a:latin typeface="Courier New" pitchFamily="49" charset="0"/>
+                <a:cs typeface="Courier New" pitchFamily="49" charset="0"/>
+              </a:rPr>
+              <a:t>,{</a:t>
+            </a:r>
+            <a:r>
+              <a:rPr lang="en-US" sz="1700" dirty="0" smtClean="0">
+                <a:latin typeface="Courier New" pitchFamily="49" charset="0"/>
+                <a:cs typeface="Courier New" pitchFamily="49" charset="0"/>
+              </a:rPr>
+              <a:t>values2},…)</a:t>
             </a:r>
             <a:endParaRPr lang="he-IL" sz="1700" dirty="0" smtClean="0">
               <a:latin typeface="Courier New" pitchFamily="49" charset="0"/>
@@ -20533,7 +20720,21 @@
                 <a:latin typeface="Courier New" pitchFamily="49" charset="0"/>
                 <a:cs typeface="Courier New" pitchFamily="49" charset="0"/>
               </a:rPr>
-              <a:t>patient = rmfield(patient,’billing’)</a:t>
+              <a:t>patient = rmfield</a:t>
+            </a:r>
+            <a:r>
+              <a:rPr lang="en-US" sz="1900" dirty="0" smtClean="0">
+                <a:latin typeface="Courier New" pitchFamily="49" charset="0"/>
+                <a:cs typeface="Courier New" pitchFamily="49" charset="0"/>
+              </a:rPr>
+              <a:t>(patient,'</a:t>
+            </a:r>
+            <a:r>
+              <a:rPr lang="en-US" sz="1900" dirty="0">
+                <a:latin typeface="Courier New" pitchFamily="49" charset="0"/>
+                <a:cs typeface="Courier New" pitchFamily="49" charset="0"/>
+              </a:rPr>
+              <a:t>billing')</a:t>
             </a:r>
             <a:endParaRPr lang="he-IL" sz="1900" dirty="0" smtClean="0">
               <a:latin typeface="Courier New" pitchFamily="49" charset="0"/>
@@ -20543,7 +20744,11 @@
           <a:p>
             <a:r>
               <a:rPr lang="he-IL" sz="2000" dirty="0" smtClean="0"/>
-              <a:t>גישה לאיבר במערך:</a:t>
+              <a:t>גישה </a:t>
+            </a:r>
+            <a:r>
+              <a:rPr lang="he-IL" sz="2000" dirty="0" smtClean="0"/>
+              <a:t>לאיבר במערך:</a:t>
             </a:r>
           </a:p>
           <a:p>
@@ -20855,87 +21060,247 @@
           </a:bodyPr>
           <a:lstStyle/>
           <a:p>
+            <a:pPr marL="342900" indent="-342900">
+              <a:buFont typeface="+mj-lt"/>
+              <a:buAutoNum type="arabicPeriod"/>
+            </a:pPr>
             <a:r>
               <a:rPr lang="en-US" dirty="0" smtClean="0">
                 <a:latin typeface="Courier New" pitchFamily="49" charset="0"/>
                 <a:cs typeface="Courier New" pitchFamily="49" charset="0"/>
               </a:rPr>
-              <a:t>1. path=fullfile(matlabroot,'toolbox\matlab\matfun')</a:t>
-            </a:r>
-          </a:p>
-          <a:p>
+              <a:t>path=fullfile(matlabroot</a:t>
+            </a:r>
             <a:r>
               <a:rPr lang="en-US" dirty="0" smtClean="0">
                 <a:latin typeface="Courier New" pitchFamily="49" charset="0"/>
                 <a:cs typeface="Courier New" pitchFamily="49" charset="0"/>
               </a:rPr>
-              <a:t>2. list = dir(path)</a:t>
-            </a:r>
-          </a:p>
-          <a:p>
+              <a:t>,'toolbox\matlab\matfun</a:t>
+            </a:r>
             <a:r>
               <a:rPr lang="en-US" dirty="0" smtClean="0">
                 <a:latin typeface="Courier New" pitchFamily="49" charset="0"/>
                 <a:cs typeface="Courier New" pitchFamily="49" charset="0"/>
               </a:rPr>
-              <a:t>3. list.isdir</a:t>
-            </a:r>
-          </a:p>
-          <a:p>
+              <a:t>')</a:t>
+            </a:r>
+          </a:p>
+          <a:p>
+            <a:pPr marL="342900" indent="-342900">
+              <a:buFont typeface="+mj-lt"/>
+              <a:buAutoNum type="arabicPeriod"/>
+            </a:pPr>
             <a:r>
               <a:rPr lang="en-US" dirty="0" smtClean="0">
                 <a:latin typeface="Courier New" pitchFamily="49" charset="0"/>
                 <a:cs typeface="Courier New" pitchFamily="49" charset="0"/>
               </a:rPr>
-              <a:t>4. IsDir = cell2mat({list.isdir})'</a:t>
-            </a:r>
-          </a:p>
-          <a:p>
+              <a:t>list = dir(path)</a:t>
+            </a:r>
+          </a:p>
+          <a:p>
+            <a:pPr marL="342900" indent="-342900">
+              <a:buFont typeface="+mj-lt"/>
+              <a:buAutoNum type="arabicPeriod"/>
+            </a:pPr>
             <a:r>
               <a:rPr lang="en-US" dirty="0" smtClean="0">
                 <a:latin typeface="Courier New" pitchFamily="49" charset="0"/>
                 <a:cs typeface="Courier New" pitchFamily="49" charset="0"/>
               </a:rPr>
-              <a:t>5. flist = ____</a:t>
-            </a:r>
-          </a:p>
-          <a:p>
+              <a:t>list.isdir</a:t>
+            </a:r>
+            <a:endParaRPr lang="en-US" dirty="0">
+              <a:latin typeface="Courier New" pitchFamily="49" charset="0"/>
+              <a:cs typeface="Courier New" pitchFamily="49" charset="0"/>
+            </a:endParaRPr>
+          </a:p>
+          <a:p>
+            <a:pPr marL="342900" indent="-342900">
+              <a:buFont typeface="+mj-lt"/>
+              <a:buAutoNum type="arabicPeriod"/>
+            </a:pPr>
             <a:r>
               <a:rPr lang="en-US" dirty="0" smtClean="0">
                 <a:latin typeface="Courier New" pitchFamily="49" charset="0"/>
                 <a:cs typeface="Courier New" pitchFamily="49" charset="0"/>
               </a:rPr>
-              <a:t>6. bytes = cell2mat({flist.bytes})'</a:t>
-            </a:r>
-          </a:p>
-          <a:p>
+              <a:t>IsDir </a:t>
+            </a:r>
             <a:r>
               <a:rPr lang="en-US" dirty="0" smtClean="0">
                 <a:latin typeface="Courier New" pitchFamily="49" charset="0"/>
                 <a:cs typeface="Courier New" pitchFamily="49" charset="0"/>
               </a:rPr>
-              <a:t>7. [mVal,mInd] = min(bytes)</a:t>
-            </a:r>
-          </a:p>
-          <a:p>
+              <a:t>= cell2mat({list.isdir</a:t>
+            </a:r>
             <a:r>
               <a:rPr lang="en-US" dirty="0" smtClean="0">
                 <a:latin typeface="Courier New" pitchFamily="49" charset="0"/>
                 <a:cs typeface="Courier New" pitchFamily="49" charset="0"/>
               </a:rPr>
-              <a:t>8. minFile = flist(__)__</a:t>
-            </a:r>
-          </a:p>
-          <a:p>
+              <a:t>})'</a:t>
+            </a:r>
+            <a:endParaRPr lang="en-US" dirty="0" smtClean="0">
+              <a:latin typeface="Courier New" pitchFamily="49" charset="0"/>
+              <a:cs typeface="Courier New" pitchFamily="49" charset="0"/>
+            </a:endParaRPr>
+          </a:p>
+          <a:p>
+            <a:pPr marL="342900" indent="-342900">
+              <a:buFont typeface="+mj-lt"/>
+              <a:buAutoNum type="arabicPeriod"/>
+            </a:pPr>
             <a:r>
               <a:rPr lang="en-US" dirty="0" smtClean="0">
                 <a:latin typeface="Courier New" pitchFamily="49" charset="0"/>
                 <a:cs typeface="Courier New" pitchFamily="49" charset="0"/>
               </a:rPr>
-              <a:t>9. fnames = ____({flist.name}</a:t>
-            </a:r>
-            <a:r>
-              <a:rPr lang="pt-BR" dirty="0" smtClean="0">
+              <a:t>flist </a:t>
+            </a:r>
+            <a:r>
+              <a:rPr lang="en-US" dirty="0" smtClean="0">
+                <a:latin typeface="Courier New" pitchFamily="49" charset="0"/>
+                <a:cs typeface="Courier New" pitchFamily="49" charset="0"/>
+              </a:rPr>
+              <a:t>= </a:t>
+            </a:r>
+            <a:r>
+              <a:rPr lang="en-US" dirty="0" smtClean="0">
+                <a:latin typeface="Courier New" pitchFamily="49" charset="0"/>
+                <a:cs typeface="Courier New" pitchFamily="49" charset="0"/>
+              </a:rPr>
+              <a:t>____</a:t>
+            </a:r>
+          </a:p>
+          <a:p>
+            <a:pPr marL="342900" indent="-342900">
+              <a:buFont typeface="+mj-lt"/>
+              <a:buAutoNum type="arabicPeriod"/>
+            </a:pPr>
+            <a:r>
+              <a:rPr lang="en-US" dirty="0" smtClean="0">
+                <a:latin typeface="Courier New" pitchFamily="49" charset="0"/>
+                <a:cs typeface="Courier New" pitchFamily="49" charset="0"/>
+              </a:rPr>
+              <a:t>bytes </a:t>
+            </a:r>
+            <a:r>
+              <a:rPr lang="en-US" dirty="0" smtClean="0">
+                <a:latin typeface="Courier New" pitchFamily="49" charset="0"/>
+                <a:cs typeface="Courier New" pitchFamily="49" charset="0"/>
+              </a:rPr>
+              <a:t>= cell2mat({flist.bytes</a:t>
+            </a:r>
+            <a:r>
+              <a:rPr lang="en-US" dirty="0" smtClean="0">
+                <a:latin typeface="Courier New" pitchFamily="49" charset="0"/>
+                <a:cs typeface="Courier New" pitchFamily="49" charset="0"/>
+              </a:rPr>
+              <a:t>})'</a:t>
+            </a:r>
+            <a:endParaRPr lang="en-US" dirty="0" smtClean="0">
+              <a:latin typeface="Courier New" pitchFamily="49" charset="0"/>
+              <a:cs typeface="Courier New" pitchFamily="49" charset="0"/>
+            </a:endParaRPr>
+          </a:p>
+          <a:p>
+            <a:pPr marL="342900" indent="-342900">
+              <a:buFont typeface="+mj-lt"/>
+              <a:buAutoNum type="arabicPeriod"/>
+            </a:pPr>
+            <a:r>
+              <a:rPr lang="en-US" dirty="0" smtClean="0">
+                <a:latin typeface="Courier New" pitchFamily="49" charset="0"/>
+                <a:cs typeface="Courier New" pitchFamily="49" charset="0"/>
+              </a:rPr>
+              <a:t>[mVal,mInd</a:t>
+            </a:r>
+            <a:r>
+              <a:rPr lang="en-US" dirty="0" smtClean="0">
+                <a:latin typeface="Courier New" pitchFamily="49" charset="0"/>
+                <a:cs typeface="Courier New" pitchFamily="49" charset="0"/>
+              </a:rPr>
+              <a:t>] = </a:t>
+            </a:r>
+            <a:r>
+              <a:rPr lang="en-US" dirty="0" smtClean="0">
+                <a:latin typeface="Courier New" pitchFamily="49" charset="0"/>
+                <a:cs typeface="Courier New" pitchFamily="49" charset="0"/>
+              </a:rPr>
+              <a:t>min(bytes)</a:t>
+            </a:r>
+          </a:p>
+          <a:p>
+            <a:pPr marL="342900" indent="-342900">
+              <a:buFont typeface="+mj-lt"/>
+              <a:buAutoNum type="arabicPeriod"/>
+            </a:pPr>
+            <a:r>
+              <a:rPr lang="en-US" dirty="0" smtClean="0">
+                <a:latin typeface="Courier New" pitchFamily="49" charset="0"/>
+                <a:cs typeface="Courier New" pitchFamily="49" charset="0"/>
+              </a:rPr>
+              <a:t>minFile </a:t>
+            </a:r>
+            <a:r>
+              <a:rPr lang="en-US" dirty="0" smtClean="0">
+                <a:latin typeface="Courier New" pitchFamily="49" charset="0"/>
+                <a:cs typeface="Courier New" pitchFamily="49" charset="0"/>
+              </a:rPr>
+              <a:t>= flist</a:t>
+            </a:r>
+            <a:r>
+              <a:rPr lang="en-US" dirty="0" smtClean="0">
+                <a:latin typeface="Courier New" pitchFamily="49" charset="0"/>
+                <a:cs typeface="Courier New" pitchFamily="49" charset="0"/>
+              </a:rPr>
+              <a:t>(__)__</a:t>
+            </a:r>
+            <a:endParaRPr lang="en-US" dirty="0">
+              <a:latin typeface="Courier New" pitchFamily="49" charset="0"/>
+              <a:cs typeface="Courier New" pitchFamily="49" charset="0"/>
+            </a:endParaRPr>
+          </a:p>
+          <a:p>
+            <a:pPr marL="342900" indent="-342900">
+              <a:buFont typeface="+mj-lt"/>
+              <a:buAutoNum type="arabicPeriod"/>
+            </a:pPr>
+            <a:r>
+              <a:rPr lang="en-US" dirty="0" smtClean="0">
+                <a:latin typeface="Courier New" pitchFamily="49" charset="0"/>
+                <a:cs typeface="Courier New" pitchFamily="49" charset="0"/>
+              </a:rPr>
+              <a:t>open(minFile)</a:t>
+            </a:r>
+            <a:endParaRPr lang="en-US" dirty="0">
+              <a:latin typeface="Courier New" pitchFamily="49" charset="0"/>
+              <a:cs typeface="Courier New" pitchFamily="49" charset="0"/>
+            </a:endParaRPr>
+          </a:p>
+          <a:p>
+            <a:pPr marL="342900" indent="-342900">
+              <a:buFont typeface="+mj-lt"/>
+              <a:buAutoNum type="arabicPeriod"/>
+            </a:pPr>
+            <a:r>
+              <a:rPr lang="en-US" dirty="0" smtClean="0">
+                <a:latin typeface="Courier New" pitchFamily="49" charset="0"/>
+                <a:cs typeface="Courier New" pitchFamily="49" charset="0"/>
+              </a:rPr>
+              <a:t>fnames </a:t>
+            </a:r>
+            <a:r>
+              <a:rPr lang="en-US" dirty="0">
+                <a:latin typeface="Courier New" pitchFamily="49" charset="0"/>
+                <a:cs typeface="Courier New" pitchFamily="49" charset="0"/>
+              </a:rPr>
+              <a:t>= ____({flist.name}</a:t>
+            </a:r>
+            <a:r>
+              <a:rPr lang="pt-BR" dirty="0">
                 <a:latin typeface="Courier New" pitchFamily="49" charset="0"/>
                 <a:cs typeface="Courier New" pitchFamily="49" charset="0"/>
               </a:rPr>
@@ -20950,30 +21315,16 @@
             </a:r>
           </a:p>
           <a:p>
+            <a:pPr marL="342900" indent="-342900">
+              <a:buFont typeface="+mj-lt"/>
+              <a:buAutoNum type="arabicPeriod"/>
+            </a:pPr>
             <a:r>
               <a:rPr lang="en-US" dirty="0" smtClean="0">
                 <a:latin typeface="Courier New" pitchFamily="49" charset="0"/>
                 <a:cs typeface="Courier New" pitchFamily="49" charset="0"/>
               </a:rPr>
-              <a:t>10.minFile_mat = ……</a:t>
-            </a:r>
-          </a:p>
-          <a:p>
-            <a:r>
-              <a:rPr lang="en-US" dirty="0" smtClean="0">
-                <a:latin typeface="Courier New" pitchFamily="49" charset="0"/>
-                <a:cs typeface="Courier New" pitchFamily="49" charset="0"/>
-              </a:rPr>
-              <a:t>% lets see why it is so small:</a:t>
-            </a:r>
-          </a:p>
-          <a:p>
-            <a:r>
-              <a:rPr lang="en-US" dirty="0" smtClean="0">
-                <a:latin typeface="Courier New" pitchFamily="49" charset="0"/>
-                <a:cs typeface="Courier New" pitchFamily="49" charset="0"/>
-              </a:rPr>
-              <a:t>open(minFile)</a:t>
+              <a:t>minFile_mat = fnames(__)</a:t>
             </a:r>
             <a:endParaRPr kumimoji="0" lang="en-US" b="0" i="0" u="none" strike="noStrike" kern="1200" cap="none" spc="0" normalizeH="0" baseline="0" noProof="0" dirty="0">
               <a:ln>
@@ -21027,7 +21378,7 @@
         <p:spPr>
           <a:xfrm>
             <a:off x="1447800" y="1828800"/>
-            <a:ext cx="7620000" cy="4876800"/>
+            <a:ext cx="7620000" cy="4724400"/>
           </a:xfrm>
         </p:spPr>
         <p:txBody>
@@ -21036,12 +21387,16 @@
           </a:bodyPr>
           <a:lstStyle/>
           <a:p>
-            <a:pPr>
+            <a:pPr marL="0" indent="0">
               <a:buNone/>
             </a:pPr>
             <a:r>
               <a:rPr lang="he-IL" sz="1800" dirty="0" smtClean="0"/>
-              <a:t>1. הספריה הנבחנת</a:t>
+              <a:t>1. הספריה </a:t>
+            </a:r>
+            <a:r>
+              <a:rPr lang="he-IL" sz="1800" dirty="0" smtClean="0"/>
+              <a:t>הנבחנת</a:t>
             </a:r>
           </a:p>
           <a:p>
@@ -21058,8 +21413,13 @@
             </a:r>
             <a:r>
               <a:rPr lang="he-IL" sz="1800" dirty="0" smtClean="0"/>
-              <a:t> מחזירה תשובה לתוך מבנה. בחנו את השדות ותחולתם.</a:t>
-            </a:r>
+              <a:t> מחזירה תשובה לתוך מבנה. בחנו את השדות </a:t>
+            </a:r>
+            <a:r>
+              <a:rPr lang="he-IL" sz="1800" dirty="0" smtClean="0"/>
+              <a:t>ותחולתם</a:t>
+            </a:r>
+            <a:endParaRPr lang="he-IL" sz="1800" dirty="0" smtClean="0"/>
           </a:p>
           <a:p>
             <a:pPr>
@@ -21076,8 +21436,13 @@
             </a:pPr>
             <a:r>
               <a:rPr lang="he-IL" sz="1800" dirty="0" smtClean="0"/>
-              <a:t>3. חלק מהאלמנטים הם תיקיות וחלק קבצים.</a:t>
-            </a:r>
+              <a:t>3. חלק מהאלמנטים הם תיקיות וחלק </a:t>
+            </a:r>
+            <a:r>
+              <a:rPr lang="he-IL" sz="1800" dirty="0" smtClean="0"/>
+              <a:t>קבצים</a:t>
+            </a:r>
+            <a:endParaRPr lang="he-IL" sz="1800" dirty="0" smtClean="0"/>
           </a:p>
           <a:p>
             <a:pPr>
@@ -21147,7 +21512,11 @@
             </a:pPr>
             <a:r>
               <a:rPr lang="he-IL" sz="1800" dirty="0" smtClean="0"/>
-              <a:t>8. השתמשו בתוצאת 7 והשלימו את הפקודה כדי לקבל את שם הקובץ המבוקש</a:t>
+              <a:t>8. השתמשו בתוצאת 7 והשלימו את הפקודה כדי לקבל את שם הקובץ </a:t>
+            </a:r>
+            <a:r>
+              <a:rPr lang="he-IL" sz="1800" dirty="0" smtClean="0"/>
+              <a:t>המבוקש</a:t>
             </a:r>
           </a:p>
           <a:p>
@@ -21156,18 +21525,65 @@
             </a:pPr>
             <a:r>
               <a:rPr lang="he-IL" sz="1800" dirty="0" smtClean="0"/>
-              <a:t>9. צרו מטריצת מחרוזות המכילה את שמות הקבצים (שלב זה לא הכרחי, אך טוב לאימון)</a:t>
-            </a:r>
+              <a:t>9. </a:t>
+            </a:r>
+            <a:r>
+              <a:rPr lang="he-IL" sz="1800" dirty="0"/>
+              <a:t>פתחו את הקובץ בעל הגודל </a:t>
+            </a:r>
+            <a:r>
+              <a:rPr lang="he-IL" sz="1800" dirty="0" smtClean="0"/>
+              <a:t>המינימלי</a:t>
+            </a:r>
+            <a:endParaRPr lang="he-IL" sz="1800" dirty="0" smtClean="0"/>
           </a:p>
           <a:p>
             <a:pPr>
               <a:buNone/>
             </a:pPr>
             <a:r>
+              <a:rPr lang="en-US" sz="1800" dirty="0" smtClean="0"/>
+              <a:t>10</a:t>
+            </a:r>
+            <a:r>
               <a:rPr lang="he-IL" sz="1800" dirty="0" smtClean="0"/>
-              <a:t>10 . פתחו את הקובץ בעל הגודל המינימלי</a:t>
-            </a:r>
-            <a:endParaRPr lang="en-US" sz="1800" dirty="0"/>
+              <a:t>. </a:t>
+            </a:r>
+            <a:r>
+              <a:rPr lang="he-IL" sz="1800" dirty="0" smtClean="0"/>
+              <a:t>צרו מטריצת מחרוזות המכילה את שמות הקבצים (שלב זה לא הכרחי, אך טוב לאימון</a:t>
+            </a:r>
+            <a:r>
+              <a:rPr lang="he-IL" sz="1800" dirty="0" smtClean="0"/>
+              <a:t>)</a:t>
+            </a:r>
+            <a:endParaRPr lang="he-IL" sz="1800" dirty="0"/>
+          </a:p>
+          <a:p>
+            <a:pPr>
+              <a:buNone/>
+            </a:pPr>
+            <a:r>
+              <a:rPr lang="he-IL" sz="1800" dirty="0" smtClean="0"/>
+              <a:t>11</a:t>
+            </a:r>
+            <a:r>
+              <a:rPr lang="he-IL" sz="1800" dirty="0"/>
+              <a:t>. השתמשו בתוצאת </a:t>
+            </a:r>
+            <a:r>
+              <a:rPr lang="he-IL" sz="1800" dirty="0" smtClean="0"/>
+              <a:t>10 והשלימו </a:t>
+            </a:r>
+            <a:r>
+              <a:rPr lang="he-IL" sz="1800" dirty="0"/>
+              <a:t>את הפקודה כדי לקבל את שם הקובץ </a:t>
+            </a:r>
+            <a:r>
+              <a:rPr lang="he-IL" sz="1800" dirty="0" smtClean="0"/>
+              <a:t>המבוקש</a:t>
+            </a:r>
+            <a:endParaRPr lang="he-IL" sz="1800" dirty="0"/>
           </a:p>
         </p:txBody>
       </p:sp>
@@ -21385,6 +21801,44 @@
                 <a:latin typeface="Courier New" pitchFamily="49" charset="0"/>
                 <a:cs typeface="Courier New" pitchFamily="49" charset="0"/>
               </a:rPr>
+              <a:t>% </a:t>
+            </a:r>
+            <a:r>
+              <a:rPr lang="en-US" sz="1800" dirty="0" smtClean="0">
+                <a:latin typeface="Courier New" pitchFamily="49" charset="0"/>
+                <a:cs typeface="Courier New" pitchFamily="49" charset="0"/>
+              </a:rPr>
+              <a:t>lets see why it is so small:</a:t>
+            </a:r>
+          </a:p>
+          <a:p>
+            <a:pPr algn="l" rtl="0">
+              <a:buNone/>
+            </a:pPr>
+            <a:r>
+              <a:rPr lang="en-US" sz="1800" dirty="0" smtClean="0">
+                <a:latin typeface="Courier New" pitchFamily="49" charset="0"/>
+                <a:cs typeface="Courier New" pitchFamily="49" charset="0"/>
+              </a:rPr>
+              <a:t>open(minFile</a:t>
+            </a:r>
+            <a:r>
+              <a:rPr lang="en-US" sz="1800" dirty="0" smtClean="0">
+                <a:latin typeface="Courier New" pitchFamily="49" charset="0"/>
+                <a:cs typeface="Courier New" pitchFamily="49" charset="0"/>
+              </a:rPr>
+              <a:t>)</a:t>
+            </a:r>
+          </a:p>
+          <a:p>
+            <a:pPr algn="l" rtl="0">
+              <a:buNone/>
+            </a:pPr>
+            <a:r>
+              <a:rPr lang="en-US" sz="1800" dirty="0">
+                <a:latin typeface="Courier New" pitchFamily="49" charset="0"/>
+                <a:cs typeface="Courier New" pitchFamily="49" charset="0"/>
+              </a:rPr>
               <a:t>fnames = strvcat({flist.name}')</a:t>
             </a:r>
           </a:p>
@@ -21393,7 +21847,7 @@
               <a:buNone/>
             </a:pPr>
             <a:r>
-              <a:rPr lang="en-US" sz="1800" dirty="0" smtClean="0">
+              <a:rPr lang="en-US" sz="1800" dirty="0">
                 <a:latin typeface="Courier New" pitchFamily="49" charset="0"/>
                 <a:cs typeface="Courier New" pitchFamily="49" charset="0"/>
               </a:rPr>
@@ -21404,25 +21858,10 @@
             <a:pPr algn="l" rtl="0">
               <a:buNone/>
             </a:pPr>
-            <a:r>
-              <a:rPr lang="en-US" sz="1800" dirty="0" smtClean="0">
-                <a:latin typeface="Courier New" pitchFamily="49" charset="0"/>
-                <a:cs typeface="Courier New" pitchFamily="49" charset="0"/>
-              </a:rPr>
-              <a:t>% lets see why it is so small:</a:t>
-            </a:r>
-          </a:p>
-          <a:p>
-            <a:pPr algn="l" rtl="0">
-              <a:buNone/>
-            </a:pPr>
-            <a:r>
-              <a:rPr lang="en-US" sz="1800" dirty="0" smtClean="0">
-                <a:latin typeface="Courier New" pitchFamily="49" charset="0"/>
-                <a:cs typeface="Courier New" pitchFamily="49" charset="0"/>
-              </a:rPr>
-              <a:t>open(minFile)</a:t>
-            </a:r>
+            <a:endParaRPr lang="en-US" sz="1800" dirty="0" smtClean="0">
+              <a:latin typeface="Courier New" pitchFamily="49" charset="0"/>
+              <a:cs typeface="Courier New" pitchFamily="49" charset="0"/>
+            </a:endParaRPr>
           </a:p>
         </p:txBody>
       </p:sp>
@@ -21869,7 +22308,18 @@
             </a:r>
             <a:r>
               <a:rPr lang="en-US" sz="2400" dirty="0" smtClean="0"/>
-              <a:t>: get(handle,’PropertyName’) </a:t>
+              <a:t>: </a:t>
+            </a:r>
+            <a:r>
+              <a:rPr lang="en-US" sz="2000" dirty="0" smtClean="0">
+                <a:latin typeface="Courier New" pitchFamily="49" charset="0"/>
+                <a:cs typeface="Courier New" pitchFamily="49" charset="0"/>
+              </a:rPr>
+              <a:t>get(handle,'PropertyName')</a:t>
+            </a:r>
+            <a:r>
+              <a:rPr lang="en-US" sz="2400" dirty="0" smtClean="0"/>
+              <a:t> </a:t>
             </a:r>
             <a:r>
               <a:rPr lang="en-US" sz="2400" dirty="0" smtClean="0">
@@ -21892,7 +22342,35 @@
             </a:r>
             <a:r>
               <a:rPr lang="en-US" sz="2400" dirty="0" smtClean="0"/>
-              <a:t>: set(handle,‘PropertyName’,PropertyVal)</a:t>
+              <a:t>: </a:t>
+            </a:r>
+            <a:r>
+              <a:rPr lang="en-US" sz="2000" dirty="0" smtClean="0">
+                <a:latin typeface="Courier New" pitchFamily="49" charset="0"/>
+                <a:cs typeface="Courier New" pitchFamily="49" charset="0"/>
+              </a:rPr>
+              <a:t>set(handle,'PropertyName</a:t>
+            </a:r>
+            <a:r>
+              <a:rPr lang="en-US" sz="2000" dirty="0">
+                <a:latin typeface="Courier New" pitchFamily="49" charset="0"/>
+                <a:cs typeface="Courier New" pitchFamily="49" charset="0"/>
+              </a:rPr>
+              <a:t>'</a:t>
+            </a:r>
+            <a:r>
+              <a:rPr lang="en-US" sz="2000" dirty="0" smtClean="0">
+                <a:latin typeface="Courier New" pitchFamily="49" charset="0"/>
+                <a:cs typeface="Courier New" pitchFamily="49" charset="0"/>
+              </a:rPr>
+              <a:t>,PropertyVal</a:t>
+            </a:r>
+            <a:r>
+              <a:rPr lang="en-US" sz="2000" dirty="0">
+                <a:latin typeface="Courier New" pitchFamily="49" charset="0"/>
+                <a:cs typeface="Courier New" pitchFamily="49" charset="0"/>
+              </a:rPr>
+              <a:t>)</a:t>
             </a:r>
           </a:p>
           <a:p>
@@ -21901,7 +22379,28 @@
             </a:pPr>
             <a:r>
               <a:rPr lang="en-US" sz="2400" dirty="0" smtClean="0"/>
-              <a:t>        set(handle,‘PropertyName’) </a:t>
+              <a:t>        </a:t>
+            </a:r>
+            <a:r>
+              <a:rPr lang="en-US" sz="2000" dirty="0" smtClean="0">
+                <a:latin typeface="Courier New" pitchFamily="49" charset="0"/>
+                <a:cs typeface="Courier New" pitchFamily="49" charset="0"/>
+              </a:rPr>
+              <a:t>set(handle,'PropertyName</a:t>
+            </a:r>
+            <a:r>
+              <a:rPr lang="en-US" sz="2000" dirty="0">
+                <a:latin typeface="Courier New" pitchFamily="49" charset="0"/>
+                <a:cs typeface="Courier New" pitchFamily="49" charset="0"/>
+              </a:rPr>
+              <a:t>'</a:t>
+            </a:r>
+            <a:r>
+              <a:rPr lang="en-US" sz="2000" dirty="0" smtClean="0">
+                <a:latin typeface="Courier New" pitchFamily="49" charset="0"/>
+                <a:cs typeface="Courier New" pitchFamily="49" charset="0"/>
+              </a:rPr>
+              <a:t>) </a:t>
             </a:r>
             <a:r>
               <a:rPr lang="en-US" sz="2400" dirty="0" smtClean="0">
@@ -21920,11 +22419,21 @@
             </a:pPr>
             <a:r>
               <a:rPr lang="en-US" sz="2400" b="1" dirty="0" smtClean="0"/>
-              <a:t>inspect</a:t>
-            </a:r>
-            <a:r>
-              <a:rPr lang="en-US" sz="2400" dirty="0" smtClean="0"/>
-              <a:t>:   inspect(handle) </a:t>
+              <a:t>inspect: </a:t>
+            </a:r>
+            <a:r>
+              <a:rPr lang="en-US" sz="2000" dirty="0" smtClean="0">
+                <a:latin typeface="Courier New" pitchFamily="49" charset="0"/>
+                <a:cs typeface="Courier New" pitchFamily="49" charset="0"/>
+              </a:rPr>
+              <a:t> </a:t>
+            </a:r>
+            <a:r>
+              <a:rPr lang="en-US" sz="2000" dirty="0" smtClean="0">
+                <a:latin typeface="Courier New" pitchFamily="49" charset="0"/>
+                <a:cs typeface="Courier New" pitchFamily="49" charset="0"/>
+              </a:rPr>
+              <a:t>inspect(handle) </a:t>
             </a:r>
             <a:r>
               <a:rPr lang="en-US" sz="2400" dirty="0" smtClean="0">
@@ -21938,15 +22447,21 @@
       </p:sp>
       <p:graphicFrame>
         <p:nvGraphicFramePr>
-          <p:cNvPr id="10" name="Table 9"/>
+          <p:cNvPr id="11" name="Table 10"/>
           <p:cNvGraphicFramePr>
             <a:graphicFrameLocks noGrp="1"/>
           </p:cNvGraphicFramePr>
-          <p:nvPr/>
+          <p:nvPr>
+            <p:extLst>
+              <p:ext uri="{D42A27DB-BD31-4B8C-83A1-F6EECF244321}">
+                <p14:modId xmlns:p14="http://schemas.microsoft.com/office/powerpoint/2010/main" val="583120061"/>
+              </p:ext>
+            </p:extLst>
+          </p:nvPr>
         </p:nvGraphicFramePr>
         <p:xfrm>
-          <a:off x="838200" y="1457718"/>
-          <a:ext cx="7467600" cy="2885682"/>
+          <a:off x="304800" y="1457718"/>
+          <a:ext cx="8610600" cy="2885682"/>
         </p:xfrm>
         <a:graphic>
           <a:graphicData uri="http://schemas.openxmlformats.org/drawingml/2006/table">
@@ -21955,9 +22470,9 @@
                 <a:tableStyleId>{5C22544A-7EE6-4342-B048-85BDC9FD1C3A}</a:tableStyleId>
               </a:tblPr>
               <a:tblGrid>
-                <a:gridCol w="2819400"/>
-                <a:gridCol w="2133600"/>
-                <a:gridCol w="2514600"/>
+                <a:gridCol w="2971800"/>
+                <a:gridCol w="1981200"/>
+                <a:gridCol w="3657600"/>
               </a:tblGrid>
               <a:tr h="304799">
                 <a:tc>
@@ -22035,14 +22550,14 @@
                     <a:p>
                       <a:r>
                         <a:rPr lang="en-US" dirty="0" smtClean="0">
-                          <a:latin typeface="Times New Roman" pitchFamily="18" charset="0"/>
-                          <a:cs typeface="Times New Roman" pitchFamily="18" charset="0"/>
+                          <a:latin typeface="Courier New" pitchFamily="49" charset="0"/>
+                          <a:cs typeface="Courier New" pitchFamily="49" charset="0"/>
                         </a:rPr>
                         <a:t>Root</a:t>
                       </a:r>
                       <a:endParaRPr lang="en-US" dirty="0">
-                        <a:latin typeface="Times New Roman" pitchFamily="18" charset="0"/>
-                        <a:cs typeface="Times New Roman" pitchFamily="18" charset="0"/>
+                        <a:latin typeface="Courier New" pitchFamily="49" charset="0"/>
+                        <a:cs typeface="Courier New" pitchFamily="49" charset="0"/>
                       </a:endParaRPr>
                     </a:p>
                   </a:txBody>
@@ -22055,14 +22570,14 @@
                     <a:p>
                       <a:r>
                         <a:rPr lang="en-US" dirty="0" smtClean="0">
-                          <a:latin typeface="Times New Roman" pitchFamily="18" charset="0"/>
-                          <a:cs typeface="Times New Roman" pitchFamily="18" charset="0"/>
+                          <a:latin typeface="Courier New" pitchFamily="49" charset="0"/>
+                          <a:cs typeface="Courier New" pitchFamily="49" charset="0"/>
                         </a:rPr>
                         <a:t>get(0)</a:t>
                       </a:r>
                       <a:endParaRPr lang="en-US" dirty="0">
-                        <a:latin typeface="Times New Roman" pitchFamily="18" charset="0"/>
-                        <a:cs typeface="Times New Roman" pitchFamily="18" charset="0"/>
+                        <a:latin typeface="Courier New" pitchFamily="49" charset="0"/>
+                        <a:cs typeface="Courier New" pitchFamily="49" charset="0"/>
                       </a:endParaRPr>
                     </a:p>
                   </a:txBody>
@@ -22075,14 +22590,14 @@
                     <a:p>
                       <a:r>
                         <a:rPr lang="en-US" dirty="0" smtClean="0">
-                          <a:latin typeface="Times New Roman" pitchFamily="18" charset="0"/>
-                          <a:cs typeface="Times New Roman" pitchFamily="18" charset="0"/>
+                          <a:latin typeface="Courier New" pitchFamily="49" charset="0"/>
+                          <a:cs typeface="Courier New" pitchFamily="49" charset="0"/>
                         </a:rPr>
                         <a:t>0</a:t>
                       </a:r>
                       <a:endParaRPr lang="en-US" dirty="0">
-                        <a:latin typeface="Times New Roman" pitchFamily="18" charset="0"/>
-                        <a:cs typeface="Times New Roman" pitchFamily="18" charset="0"/>
+                        <a:latin typeface="Courier New" pitchFamily="49" charset="0"/>
+                        <a:cs typeface="Courier New" pitchFamily="49" charset="0"/>
                       </a:endParaRPr>
                     </a:p>
                   </a:txBody>
@@ -22097,14 +22612,14 @@
                     <a:p>
                       <a:r>
                         <a:rPr lang="en-US" dirty="0" smtClean="0">
-                          <a:latin typeface="Times New Roman" pitchFamily="18" charset="0"/>
-                          <a:cs typeface="Times New Roman" pitchFamily="18" charset="0"/>
+                          <a:latin typeface="Courier New" pitchFamily="49" charset="0"/>
+                          <a:cs typeface="Courier New" pitchFamily="49" charset="0"/>
                         </a:rPr>
                         <a:t>Figure</a:t>
                       </a:r>
                       <a:endParaRPr lang="en-US" dirty="0">
-                        <a:latin typeface="Times New Roman" pitchFamily="18" charset="0"/>
-                        <a:cs typeface="Times New Roman" pitchFamily="18" charset="0"/>
+                        <a:latin typeface="Courier New" pitchFamily="49" charset="0"/>
+                        <a:cs typeface="Courier New" pitchFamily="49" charset="0"/>
                       </a:endParaRPr>
                     </a:p>
                   </a:txBody>
@@ -22116,12 +22631,15 @@
                     <a:lstStyle/>
                     <a:p>
                       <a:r>
-                        <a:rPr lang="en-US" dirty="0" smtClean="0"/>
+                        <a:rPr lang="en-US" dirty="0" smtClean="0">
+                          <a:latin typeface="Courier New" pitchFamily="49" charset="0"/>
+                          <a:cs typeface="Courier New" pitchFamily="49" charset="0"/>
+                        </a:rPr>
                         <a:t>get(hf)</a:t>
                       </a:r>
                       <a:endParaRPr lang="en-US" dirty="0">
-                        <a:latin typeface="Times New Roman" pitchFamily="18" charset="0"/>
-                        <a:cs typeface="Times New Roman" pitchFamily="18" charset="0"/>
+                        <a:latin typeface="Courier New" pitchFamily="49" charset="0"/>
+                        <a:cs typeface="Courier New" pitchFamily="49" charset="0"/>
                       </a:endParaRPr>
                     </a:p>
                   </a:txBody>
@@ -22133,12 +22651,15 @@
                     <a:lstStyle/>
                     <a:p>
                       <a:r>
-                        <a:rPr lang="en-US" dirty="0" smtClean="0"/>
+                        <a:rPr lang="en-US" dirty="0" smtClean="0">
+                          <a:latin typeface="Courier New" pitchFamily="49" charset="0"/>
+                          <a:cs typeface="Courier New" pitchFamily="49" charset="0"/>
+                        </a:rPr>
                         <a:t>hf = gcf, hf = figure(1)</a:t>
                       </a:r>
                       <a:endParaRPr lang="en-US" dirty="0">
-                        <a:latin typeface="Times New Roman" pitchFamily="18" charset="0"/>
-                        <a:cs typeface="Times New Roman" pitchFamily="18" charset="0"/>
+                        <a:latin typeface="Courier New" pitchFamily="49" charset="0"/>
+                        <a:cs typeface="Courier New" pitchFamily="49" charset="0"/>
                       </a:endParaRPr>
                     </a:p>
                   </a:txBody>
@@ -22153,14 +22674,14 @@
                     <a:p>
                       <a:r>
                         <a:rPr lang="en-US" dirty="0" smtClean="0">
-                          <a:latin typeface="Times New Roman" pitchFamily="18" charset="0"/>
-                          <a:cs typeface="Times New Roman" pitchFamily="18" charset="0"/>
+                          <a:latin typeface="Courier New" pitchFamily="49" charset="0"/>
+                          <a:cs typeface="Courier New" pitchFamily="49" charset="0"/>
                         </a:rPr>
                         <a:t>Axes</a:t>
                       </a:r>
                       <a:endParaRPr lang="en-US" dirty="0">
-                        <a:latin typeface="Times New Roman" pitchFamily="18" charset="0"/>
-                        <a:cs typeface="Times New Roman" pitchFamily="18" charset="0"/>
+                        <a:latin typeface="Courier New" pitchFamily="49" charset="0"/>
+                        <a:cs typeface="Courier New" pitchFamily="49" charset="0"/>
                       </a:endParaRPr>
                     </a:p>
                   </a:txBody>
@@ -22189,18 +22710,24 @@
                         <a:defRPr/>
                       </a:pPr>
                       <a:r>
-                        <a:rPr lang="en-US" dirty="0" smtClean="0"/>
+                        <a:rPr lang="en-US" dirty="0" smtClean="0">
+                          <a:latin typeface="Courier New" pitchFamily="49" charset="0"/>
+                          <a:cs typeface="Courier New" pitchFamily="49" charset="0"/>
+                        </a:rPr>
                         <a:t>g</a:t>
                       </a:r>
                       <a:r>
-                        <a:rPr lang="sv-SE" dirty="0" smtClean="0"/>
+                        <a:rPr lang="sv-SE" dirty="0" smtClean="0">
+                          <a:latin typeface="Courier New" pitchFamily="49" charset="0"/>
+                          <a:cs typeface="Courier New" pitchFamily="49" charset="0"/>
+                        </a:rPr>
                         <a:t>et(ha) </a:t>
                       </a:r>
                     </a:p>
                     <a:p>
                       <a:endParaRPr lang="en-US" dirty="0">
-                        <a:latin typeface="Times New Roman" pitchFamily="18" charset="0"/>
-                        <a:cs typeface="Times New Roman" pitchFamily="18" charset="0"/>
+                        <a:latin typeface="Courier New" pitchFamily="49" charset="0"/>
+                        <a:cs typeface="Courier New" pitchFamily="49" charset="0"/>
                       </a:endParaRPr>
                     </a:p>
                   </a:txBody>
@@ -22229,7 +22756,10 @@
                         <a:defRPr/>
                       </a:pPr>
                       <a:r>
-                        <a:rPr lang="en-US" dirty="0" smtClean="0"/>
+                        <a:rPr lang="en-US" dirty="0" smtClean="0">
+                          <a:latin typeface="Courier New" pitchFamily="49" charset="0"/>
+                          <a:cs typeface="Courier New" pitchFamily="49" charset="0"/>
+                        </a:rPr>
                         <a:t>ha = gca</a:t>
                       </a:r>
                     </a:p>
@@ -22252,16 +22782,53 @@
                         <a:defRPr/>
                       </a:pPr>
                       <a:r>
-                        <a:rPr lang="sv-SE" dirty="0" smtClean="0"/>
-                        <a:t>ha = axes(</a:t>
+                        <a:rPr lang="sv-SE" dirty="0" smtClean="0">
+                          <a:latin typeface="Courier New" pitchFamily="49" charset="0"/>
+                          <a:cs typeface="Courier New" pitchFamily="49" charset="0"/>
+                        </a:rPr>
+                        <a:t>ha = axes</a:t>
                       </a:r>
                       <a:r>
-                        <a:rPr lang="en-US" dirty="0" smtClean="0"/>
-                        <a:t>‘</a:t>
+                        <a:rPr lang="sv-SE" dirty="0" smtClean="0">
+                          <a:latin typeface="Courier New" pitchFamily="49" charset="0"/>
+                          <a:cs typeface="Courier New" pitchFamily="49" charset="0"/>
+                        </a:rPr>
+                        <a:t>(</a:t>
                       </a:r>
                       <a:r>
-                        <a:rPr lang="sv-SE" dirty="0" smtClean="0"/>
-                        <a:t>Parent’,hf)</a:t>
+                        <a:rPr lang="en-US" sz="1800" dirty="0" smtClean="0">
+                          <a:latin typeface="Courier New" pitchFamily="49" charset="0"/>
+                          <a:cs typeface="Courier New" pitchFamily="49" charset="0"/>
+                        </a:rPr>
+                        <a:t>'</a:t>
+                      </a:r>
+                      <a:r>
+                        <a:rPr lang="sv-SE" dirty="0" smtClean="0">
+                          <a:latin typeface="Courier New" pitchFamily="49" charset="0"/>
+                          <a:cs typeface="Courier New" pitchFamily="49" charset="0"/>
+                        </a:rPr>
+                        <a:t>Parent</a:t>
+                      </a:r>
+                      <a:r>
+                        <a:rPr lang="en-US" sz="1800" dirty="0" smtClean="0">
+                          <a:latin typeface="Courier New" pitchFamily="49" charset="0"/>
+                          <a:cs typeface="Courier New" pitchFamily="49" charset="0"/>
+                        </a:rPr>
+                        <a:t>'</a:t>
+                      </a:r>
+                      <a:r>
+                        <a:rPr lang="sv-SE" dirty="0" smtClean="0">
+                          <a:latin typeface="Courier New" pitchFamily="49" charset="0"/>
+                          <a:cs typeface="Courier New" pitchFamily="49" charset="0"/>
+                        </a:rPr>
+                        <a:t>,</a:t>
+                      </a:r>
+                      <a:r>
+                        <a:rPr lang="sv-SE" dirty="0" smtClean="0">
+                          <a:latin typeface="Courier New" pitchFamily="49" charset="0"/>
+                          <a:cs typeface="Courier New" pitchFamily="49" charset="0"/>
+                        </a:rPr>
+                        <a:t>hf)</a:t>
                       </a:r>
                     </a:p>
                     <a:p>
@@ -22283,16 +22850,22 @@
                         <a:defRPr/>
                       </a:pPr>
                       <a:r>
-                        <a:rPr lang="sv-SE" dirty="0" smtClean="0"/>
+                        <a:rPr lang="sv-SE" dirty="0" smtClean="0">
+                          <a:latin typeface="Courier New" pitchFamily="49" charset="0"/>
+                          <a:cs typeface="Courier New" pitchFamily="49" charset="0"/>
+                        </a:rPr>
                         <a:t>h</a:t>
                       </a:r>
                       <a:r>
-                        <a:rPr lang="en-US" dirty="0" smtClean="0"/>
+                        <a:rPr lang="en-US" dirty="0" smtClean="0">
+                          <a:latin typeface="Courier New" pitchFamily="49" charset="0"/>
+                          <a:cs typeface="Courier New" pitchFamily="49" charset="0"/>
+                        </a:rPr>
                         <a:t>a = subplot(m,n,k)</a:t>
                       </a:r>
                       <a:endParaRPr lang="en-US" dirty="0">
-                        <a:latin typeface="Times New Roman" pitchFamily="18" charset="0"/>
-                        <a:cs typeface="Times New Roman" pitchFamily="18" charset="0"/>
+                        <a:latin typeface="Courier New" pitchFamily="49" charset="0"/>
+                        <a:cs typeface="Courier New" pitchFamily="49" charset="0"/>
                       </a:endParaRPr>
                     </a:p>
                   </a:txBody>
@@ -22307,14 +22880,14 @@
                     <a:p>
                       <a:r>
                         <a:rPr lang="en-US" dirty="0" smtClean="0">
-                          <a:latin typeface="Times New Roman" pitchFamily="18" charset="0"/>
-                          <a:cs typeface="Times New Roman" pitchFamily="18" charset="0"/>
+                          <a:latin typeface="Courier New" pitchFamily="49" charset="0"/>
+                          <a:cs typeface="Courier New" pitchFamily="49" charset="0"/>
                         </a:rPr>
                         <a:t>Object (line,patch,surface)</a:t>
                       </a:r>
                       <a:endParaRPr lang="en-US" dirty="0">
-                        <a:latin typeface="Times New Roman" pitchFamily="18" charset="0"/>
-                        <a:cs typeface="Times New Roman" pitchFamily="18" charset="0"/>
+                        <a:latin typeface="Courier New" pitchFamily="49" charset="0"/>
+                        <a:cs typeface="Courier New" pitchFamily="49" charset="0"/>
                       </a:endParaRPr>
                     </a:p>
                   </a:txBody>
@@ -22326,12 +22899,15 @@
                     <a:lstStyle/>
                     <a:p>
                       <a:r>
-                        <a:rPr lang="en-US" dirty="0" smtClean="0"/>
+                        <a:rPr lang="en-US" dirty="0" smtClean="0">
+                          <a:latin typeface="Courier New" pitchFamily="49" charset="0"/>
+                          <a:cs typeface="Courier New" pitchFamily="49" charset="0"/>
+                        </a:rPr>
                         <a:t>get(ho)</a:t>
                       </a:r>
                       <a:endParaRPr lang="en-US" dirty="0">
-                        <a:latin typeface="Times New Roman" pitchFamily="18" charset="0"/>
-                        <a:cs typeface="Times New Roman" pitchFamily="18" charset="0"/>
+                        <a:latin typeface="Courier New" pitchFamily="49" charset="0"/>
+                        <a:cs typeface="Courier New" pitchFamily="49" charset="0"/>
                       </a:endParaRPr>
                     </a:p>
                   </a:txBody>
@@ -22360,7 +22936,10 @@
                         <a:defRPr/>
                       </a:pPr>
                       <a:r>
-                        <a:rPr lang="en-US" dirty="0" smtClean="0"/>
+                        <a:rPr lang="en-US" dirty="0" smtClean="0">
+                          <a:latin typeface="Courier New" pitchFamily="49" charset="0"/>
+                          <a:cs typeface="Courier New" pitchFamily="49" charset="0"/>
+                        </a:rPr>
                         <a:t>ho = gco (if selected)</a:t>
                       </a:r>
                     </a:p>
@@ -22383,12 +22962,57 @@
                         <a:defRPr/>
                       </a:pPr>
                       <a:r>
-                        <a:rPr lang="en-US" dirty="0" smtClean="0"/>
-                        <a:t>ho = plot(…,’Parent’,ha)</a:t>
+                        <a:rPr lang="en-US" dirty="0" smtClean="0">
+                          <a:latin typeface="Courier New" pitchFamily="49" charset="0"/>
+                          <a:cs typeface="Courier New" pitchFamily="49" charset="0"/>
+                        </a:rPr>
+                        <a:t>ho = plot</a:t>
+                      </a:r>
+                      <a:r>
+                        <a:rPr lang="en-US" dirty="0" smtClean="0">
+                          <a:latin typeface="Courier New" pitchFamily="49" charset="0"/>
+                          <a:cs typeface="Courier New" pitchFamily="49" charset="0"/>
+                        </a:rPr>
+                        <a:t>(…,</a:t>
+                      </a:r>
+                      <a:r>
+                        <a:rPr lang="en-US" sz="1800" dirty="0" smtClean="0">
+                          <a:latin typeface="Courier New" pitchFamily="49" charset="0"/>
+                          <a:cs typeface="Courier New" pitchFamily="49" charset="0"/>
+                        </a:rPr>
+                        <a:t> '</a:t>
+                      </a:r>
+                      <a:r>
+                        <a:rPr lang="en-US" dirty="0" smtClean="0">
+                          <a:latin typeface="Courier New" pitchFamily="49" charset="0"/>
+                          <a:cs typeface="Courier New" pitchFamily="49" charset="0"/>
+                        </a:rPr>
+                        <a:t>Parent</a:t>
+                      </a:r>
+                      <a:r>
+                        <a:rPr lang="en-US" sz="1800" dirty="0" smtClean="0">
+                          <a:latin typeface="Courier New" pitchFamily="49" charset="0"/>
+                          <a:cs typeface="Courier New" pitchFamily="49" charset="0"/>
+                        </a:rPr>
+                        <a:t>'</a:t>
+                      </a:r>
+                      <a:r>
+                        <a:rPr lang="en-US" dirty="0" smtClean="0">
+                          <a:latin typeface="Courier New" pitchFamily="49" charset="0"/>
+                          <a:cs typeface="Courier New" pitchFamily="49" charset="0"/>
+                        </a:rPr>
+                        <a:t>,</a:t>
+                      </a:r>
+                      <a:r>
+                        <a:rPr lang="en-US" dirty="0" smtClean="0">
+                          <a:latin typeface="Courier New" pitchFamily="49" charset="0"/>
+                          <a:cs typeface="Courier New" pitchFamily="49" charset="0"/>
+                        </a:rPr>
+                        <a:t>ha)</a:t>
                       </a:r>
                       <a:endParaRPr lang="en-US" dirty="0">
-                        <a:latin typeface="Times New Roman" pitchFamily="18" charset="0"/>
-                        <a:cs typeface="Times New Roman" pitchFamily="18" charset="0"/>
+                        <a:latin typeface="Courier New" pitchFamily="49" charset="0"/>
+                        <a:cs typeface="Courier New" pitchFamily="49" charset="0"/>
                       </a:endParaRPr>
                     </a:p>
                   </a:txBody>
@@ -22511,7 +23135,21 @@
                 <a:latin typeface="Courier New" pitchFamily="49" charset="0"/>
                 <a:cs typeface="Courier New" pitchFamily="49" charset="0"/>
               </a:rPr>
-              <a:t>plot(Xdata,Ydata,…,’properties’,values,…)</a:t>
+              <a:t>plot(Xdata,Ydata</a:t>
+            </a:r>
+            <a:r>
+              <a:rPr lang="en-US" sz="1800" dirty="0" smtClean="0">
+                <a:latin typeface="Courier New" pitchFamily="49" charset="0"/>
+                <a:cs typeface="Courier New" pitchFamily="49" charset="0"/>
+              </a:rPr>
+              <a:t>,…,'properties',</a:t>
+            </a:r>
+            <a:r>
+              <a:rPr lang="en-US" sz="1800" dirty="0" smtClean="0">
+                <a:latin typeface="Courier New" pitchFamily="49" charset="0"/>
+                <a:cs typeface="Courier New" pitchFamily="49" charset="0"/>
+              </a:rPr>
+              <a:t>values,…)</a:t>
             </a:r>
             <a:endParaRPr lang="he-IL" sz="1800" dirty="0" smtClean="0">
               <a:latin typeface="Courier New" pitchFamily="49" charset="0"/>
@@ -22727,7 +23365,14 @@
                 <a:latin typeface="Courier New" pitchFamily="49" charset="0"/>
                 <a:cs typeface="Courier New" pitchFamily="49" charset="0"/>
               </a:rPr>
-              <a:t>plot(x,y,’symbols’)</a:t>
+              <a:t>plot(x,y</a:t>
+            </a:r>
+            <a:r>
+              <a:rPr lang="en-US" sz="2000" dirty="0" smtClean="0">
+                <a:latin typeface="Courier New" pitchFamily="49" charset="0"/>
+                <a:cs typeface="Courier New" pitchFamily="49" charset="0"/>
+              </a:rPr>
+              <a:t>,'symbols')</a:t>
             </a:r>
             <a:endParaRPr lang="he-IL" sz="2000" dirty="0" smtClean="0">
               <a:latin typeface="Courier New" pitchFamily="49" charset="0"/>
@@ -24236,7 +24881,21 @@
                 <a:latin typeface="Courier New" pitchFamily="49" charset="0"/>
                 <a:cs typeface="Courier New" pitchFamily="49" charset="0"/>
               </a:rPr>
-              <a:t>&gt;&gt;plot(x,y,’property1’,val1,…)</a:t>
+              <a:t>&gt;&gt;plot(x,y</a:t>
+            </a:r>
+            <a:r>
+              <a:rPr lang="en-US" sz="1800" dirty="0" smtClean="0">
+                <a:latin typeface="Courier New" pitchFamily="49" charset="0"/>
+                <a:cs typeface="Courier New" pitchFamily="49" charset="0"/>
+              </a:rPr>
+              <a:t>,'property1',</a:t>
+            </a:r>
+            <a:r>
+              <a:rPr lang="en-US" sz="1800" dirty="0" smtClean="0">
+                <a:latin typeface="Courier New" pitchFamily="49" charset="0"/>
+                <a:cs typeface="Courier New" pitchFamily="49" charset="0"/>
+              </a:rPr>
+              <a:t>val1,…)</a:t>
             </a:r>
             <a:endParaRPr lang="he-IL" sz="1800" dirty="0" smtClean="0">
               <a:latin typeface="Courier New" pitchFamily="49" charset="0"/>
@@ -25093,12 +25752,13 @@
             </a:r>
             <a:r>
               <a:rPr lang="he-IL" sz="2000" dirty="0" smtClean="0"/>
-              <a:t> – מאפשרת להוסיף אובייקט גרפי נוסף במקום החלפת הישן בחדש</a:t>
-            </a:r>
-            <a:r>
-              <a:rPr lang="en-US" sz="2000" dirty="0" smtClean="0"/>
-              <a:t>\</a:t>
-            </a:r>
+              <a:t> – מאפשרת להוסיף אובייקט גרפי נוסף במקום החלפת הישן </a:t>
+            </a:r>
+            <a:r>
+              <a:rPr lang="he-IL" sz="2000" dirty="0" smtClean="0"/>
+              <a:t>בחדש</a:t>
+            </a:r>
+            <a:endParaRPr lang="en-US" sz="2000" dirty="0" smtClean="0"/>
           </a:p>
           <a:p>
             <a:r>
@@ -25348,7 +26008,7 @@
               <a:t>'</a:t>
             </a:r>
             <a:r>
-              <a:rPr lang="es-ES" sz="1800" dirty="0" err="1" smtClean="0">
+              <a:rPr lang="es-ES" sz="1800" dirty="0" smtClean="0">
                 <a:latin typeface="Courier New" pitchFamily="49" charset="0"/>
                 <a:cs typeface="Courier New" pitchFamily="49" charset="0"/>
               </a:rPr>
@@ -26973,7 +27633,7 @@
               <a:t>'</a:t>
             </a:r>
             <a:r>
-              <a:rPr lang="en-US" sz="1800" dirty="0" err="1" smtClean="0">
+              <a:rPr lang="en-US" sz="1800" dirty="0" smtClean="0">
                 <a:latin typeface="Courier New" pitchFamily="49" charset="0"/>
                 <a:cs typeface="Courier New" pitchFamily="49" charset="0"/>
               </a:rPr>
@@ -28933,7 +29593,7 @@
           <a:graphicData uri="http://schemas.openxmlformats.org/presentationml/2006/ole">
             <mc:AlternateContent xmlns:mc="http://schemas.openxmlformats.org/markup-compatibility/2006">
               <mc:Choice xmlns:v="urn:schemas-microsoft-com:vml" Requires="v">
-                <p:oleObj spid="_x0000_s91149" name="Equation" r:id="rId3" imgW="1282680" imgH="507960" progId="Equation.DSMT4">
+                <p:oleObj spid="_x0000_s91154" name="Equation" r:id="rId3" imgW="1282680" imgH="507960" progId="Equation.DSMT4">
                   <p:embed/>
                 </p:oleObj>
               </mc:Choice>
@@ -29128,7 +29788,21 @@
                 <a:latin typeface="Courier New" pitchFamily="49" charset="0"/>
                 <a:cs typeface="Courier New" pitchFamily="49" charset="0"/>
               </a:rPr>
-              <a:t>set(h,’property’,propval)</a:t>
+              <a:t>set(h</a:t>
+            </a:r>
+            <a:r>
+              <a:rPr lang="en-US" dirty="0" smtClean="0">
+                <a:latin typeface="Courier New" pitchFamily="49" charset="0"/>
+                <a:cs typeface="Courier New" pitchFamily="49" charset="0"/>
+              </a:rPr>
+              <a:t>,'property',</a:t>
+            </a:r>
+            <a:r>
+              <a:rPr lang="en-US" dirty="0" smtClean="0">
+                <a:latin typeface="Courier New" pitchFamily="49" charset="0"/>
+                <a:cs typeface="Courier New" pitchFamily="49" charset="0"/>
+              </a:rPr>
+              <a:t>propval)</a:t>
             </a:r>
           </a:p>
         </p:txBody>
@@ -29231,18 +29905,26 @@
             <p:ph idx="1"/>
           </p:nvPr>
         </p:nvSpPr>
-        <p:spPr/>
+        <p:spPr>
+          <a:xfrm>
+            <a:off x="457200" y="1447800"/>
+            <a:ext cx="8229600" cy="5029200"/>
+          </a:xfrm>
+        </p:spPr>
         <p:txBody>
           <a:bodyPr>
-            <a:normAutofit fontScale="62500" lnSpcReduction="20000"/>
+            <a:noAutofit/>
           </a:bodyPr>
           <a:lstStyle/>
           <a:p>
             <a:pPr algn="l" rtl="0">
-              <a:buNone/>
-            </a:pPr>
-            <a:r>
-              <a:rPr lang="en-US" sz="2800" dirty="0" smtClean="0">
+              <a:spcBef>
+                <a:spcPts val="0"/>
+              </a:spcBef>
+              <a:buNone/>
+            </a:pPr>
+            <a:r>
+              <a:rPr lang="en-US" sz="1800" dirty="0" smtClean="0">
                 <a:solidFill>
                   <a:srgbClr val="000000"/>
                 </a:solidFill>
@@ -29253,10 +29935,13 @@
           </a:p>
           <a:p>
             <a:pPr algn="l" rtl="0">
-              <a:buNone/>
-            </a:pPr>
-            <a:r>
-              <a:rPr lang="en-US" sz="2800" dirty="0" smtClean="0">
+              <a:spcBef>
+                <a:spcPts val="0"/>
+              </a:spcBef>
+              <a:buNone/>
+            </a:pPr>
+            <a:r>
+              <a:rPr lang="en-US" sz="1800" dirty="0" smtClean="0">
                 <a:solidFill>
                   <a:srgbClr val="000000"/>
                 </a:solidFill>
@@ -29267,10 +29952,13 @@
           </a:p>
           <a:p>
             <a:pPr algn="l" rtl="0">
-              <a:buNone/>
-            </a:pPr>
-            <a:r>
-              <a:rPr lang="en-US" sz="2800" dirty="0" smtClean="0">
+              <a:spcBef>
+                <a:spcPts val="0"/>
+              </a:spcBef>
+              <a:buNone/>
+            </a:pPr>
+            <a:r>
+              <a:rPr lang="en-US" sz="1800" dirty="0" smtClean="0">
                 <a:solidFill>
                   <a:srgbClr val="000000"/>
                 </a:solidFill>
@@ -29281,10 +29969,13 @@
           </a:p>
           <a:p>
             <a:pPr algn="l" rtl="0">
-              <a:buNone/>
-            </a:pPr>
-            <a:r>
-              <a:rPr lang="en-US" sz="2800" dirty="0" smtClean="0">
+              <a:spcBef>
+                <a:spcPts val="0"/>
+              </a:spcBef>
+              <a:buNone/>
+            </a:pPr>
+            <a:r>
+              <a:rPr lang="en-US" sz="1800" dirty="0" smtClean="0">
                 <a:solidFill>
                   <a:srgbClr val="000000"/>
                 </a:solidFill>
@@ -29295,10 +29986,13 @@
           </a:p>
           <a:p>
             <a:pPr algn="l" rtl="0">
-              <a:buNone/>
-            </a:pPr>
-            <a:r>
-              <a:rPr lang="en-US" sz="2800" dirty="0" smtClean="0">
+              <a:spcBef>
+                <a:spcPts val="0"/>
+              </a:spcBef>
+              <a:buNone/>
+            </a:pPr>
+            <a:r>
+              <a:rPr lang="en-US" sz="1800" dirty="0" smtClean="0">
                 <a:solidFill>
                   <a:srgbClr val="000000"/>
                 </a:solidFill>
@@ -29307,7 +30001,7 @@
               <a:t>dydt(end+1)=dydt(end); </a:t>
             </a:r>
             <a:r>
-              <a:rPr lang="en-US" sz="2800" dirty="0" smtClean="0">
+              <a:rPr lang="en-US" sz="1800" dirty="0" smtClean="0">
                 <a:solidFill>
                   <a:srgbClr val="228B22"/>
                 </a:solidFill>
@@ -29318,10 +30012,13 @@
           </a:p>
           <a:p>
             <a:pPr algn="l" rtl="0">
-              <a:buNone/>
-            </a:pPr>
-            <a:r>
-              <a:rPr lang="en-US" sz="2800" dirty="0" smtClean="0">
+              <a:spcBef>
+                <a:spcPts val="0"/>
+              </a:spcBef>
+              <a:buNone/>
+            </a:pPr>
+            <a:r>
+              <a:rPr lang="en-US" sz="1800" dirty="0" smtClean="0">
                 <a:solidFill>
                   <a:srgbClr val="000000"/>
                 </a:solidFill>
@@ -29332,10 +30029,13 @@
           </a:p>
           <a:p>
             <a:pPr algn="l" rtl="0">
-              <a:buNone/>
-            </a:pPr>
-            <a:r>
-              <a:rPr lang="en-US" sz="2800" dirty="0" smtClean="0">
+              <a:spcBef>
+                <a:spcPts val="0"/>
+              </a:spcBef>
+              <a:buNone/>
+            </a:pPr>
+            <a:r>
+              <a:rPr lang="en-US" sz="1800" dirty="0" smtClean="0">
                 <a:solidFill>
                   <a:srgbClr val="000000"/>
                 </a:solidFill>
@@ -29344,7 +30044,7 @@
               <a:t>d2ydt2(end+(1:2))=d2ydt2(end); </a:t>
             </a:r>
             <a:r>
-              <a:rPr lang="en-US" sz="2800" dirty="0" smtClean="0">
+              <a:rPr lang="en-US" sz="1800" dirty="0" smtClean="0">
                 <a:solidFill>
                   <a:srgbClr val="228B22"/>
                 </a:solidFill>
@@ -29355,10 +30055,13 @@
           </a:p>
           <a:p>
             <a:pPr algn="l" rtl="0">
-              <a:buNone/>
-            </a:pPr>
-            <a:r>
-              <a:rPr lang="en-US" sz="2800" dirty="0" smtClean="0">
+              <a:spcBef>
+                <a:spcPts val="0"/>
+              </a:spcBef>
+              <a:buNone/>
+            </a:pPr>
+            <a:r>
+              <a:rPr lang="en-US" sz="1800" dirty="0" smtClean="0">
                 <a:solidFill>
                   <a:srgbClr val="228B22"/>
                 </a:solidFill>
@@ -29369,10 +30072,13 @@
           </a:p>
           <a:p>
             <a:pPr algn="l" rtl="0">
-              <a:buNone/>
-            </a:pPr>
-            <a:r>
-              <a:rPr lang="en-US" sz="2800" dirty="0" smtClean="0">
+              <a:spcBef>
+                <a:spcPts val="0"/>
+              </a:spcBef>
+              <a:buNone/>
+            </a:pPr>
+            <a:r>
+              <a:rPr lang="en-US" sz="1800" dirty="0" smtClean="0">
                 <a:solidFill>
                   <a:srgbClr val="000000"/>
                 </a:solidFill>
@@ -29383,10 +30089,13 @@
           </a:p>
           <a:p>
             <a:pPr algn="l" rtl="0">
-              <a:buNone/>
-            </a:pPr>
-            <a:r>
-              <a:rPr lang="en-US" sz="2800" dirty="0" smtClean="0">
+              <a:spcBef>
+                <a:spcPts val="0"/>
+              </a:spcBef>
+              <a:buNone/>
+            </a:pPr>
+            <a:r>
+              <a:rPr lang="en-US" sz="1800" dirty="0" smtClean="0">
                 <a:solidFill>
                   <a:srgbClr val="000000"/>
                 </a:solidFill>
@@ -29395,7 +30104,7 @@
               <a:t>xlabel(</a:t>
             </a:r>
             <a:r>
-              <a:rPr lang="en-US" sz="2800" dirty="0" smtClean="0">
+              <a:rPr lang="en-US" sz="1800" dirty="0" smtClean="0">
                 <a:solidFill>
                   <a:srgbClr val="A020F0"/>
                 </a:solidFill>
@@ -29404,7 +30113,7 @@
               <a:t>'Time [sec]'</a:t>
             </a:r>
             <a:r>
-              <a:rPr lang="en-US" sz="2800" dirty="0" smtClean="0">
+              <a:rPr lang="en-US" sz="1800" dirty="0" smtClean="0">
                 <a:solidFill>
                   <a:srgbClr val="000000"/>
                 </a:solidFill>
@@ -29415,10 +30124,13 @@
           </a:p>
           <a:p>
             <a:pPr algn="l" rtl="0">
-              <a:buNone/>
-            </a:pPr>
-            <a:r>
-              <a:rPr lang="en-US" sz="2800" dirty="0" smtClean="0">
+              <a:spcBef>
+                <a:spcPts val="0"/>
+              </a:spcBef>
+              <a:buNone/>
+            </a:pPr>
+            <a:r>
+              <a:rPr lang="en-US" sz="1800" dirty="0" smtClean="0">
                 <a:solidFill>
                   <a:srgbClr val="000000"/>
                 </a:solidFill>
@@ -29429,10 +30141,13 @@
           </a:p>
           <a:p>
             <a:pPr algn="l" rtl="0">
-              <a:buNone/>
-            </a:pPr>
-            <a:r>
-              <a:rPr lang="en-US" sz="2800" dirty="0" smtClean="0">
+              <a:spcBef>
+                <a:spcPts val="0"/>
+              </a:spcBef>
+              <a:buNone/>
+            </a:pPr>
+            <a:r>
+              <a:rPr lang="en-US" sz="1800" dirty="0" smtClean="0">
                 <a:solidFill>
                   <a:srgbClr val="000000"/>
                 </a:solidFill>
@@ -29441,7 +30156,7 @@
               <a:t>ylabel(</a:t>
             </a:r>
             <a:r>
-              <a:rPr lang="en-US" sz="2800" dirty="0" smtClean="0">
+              <a:rPr lang="en-US" sz="1800" dirty="0" smtClean="0">
                 <a:solidFill>
                   <a:srgbClr val="A020F0"/>
                 </a:solidFill>
@@ -29450,7 +30165,7 @@
               <a:t>'volt, volt/s'</a:t>
             </a:r>
             <a:r>
-              <a:rPr lang="en-US" sz="2800" dirty="0" smtClean="0">
+              <a:rPr lang="en-US" sz="1800" dirty="0" smtClean="0">
                 <a:solidFill>
                   <a:srgbClr val="000000"/>
                 </a:solidFill>
@@ -29461,10 +30176,13 @@
           </a:p>
           <a:p>
             <a:pPr algn="l" rtl="0">
-              <a:buNone/>
-            </a:pPr>
-            <a:r>
-              <a:rPr lang="en-US" sz="2800" dirty="0" smtClean="0">
+              <a:spcBef>
+                <a:spcPts val="0"/>
+              </a:spcBef>
+              <a:buNone/>
+            </a:pPr>
+            <a:r>
+              <a:rPr lang="en-US" sz="1800" dirty="0" smtClean="0">
                 <a:solidFill>
                   <a:srgbClr val="000000"/>
                 </a:solidFill>
@@ -29473,7 +30191,7 @@
               <a:t>title(</a:t>
             </a:r>
             <a:r>
-              <a:rPr lang="en-US" sz="2800" dirty="0" smtClean="0">
+              <a:rPr lang="en-US" sz="1800" dirty="0" smtClean="0">
                 <a:solidFill>
                   <a:srgbClr val="A020F0"/>
                 </a:solidFill>
@@ -29482,7 +30200,7 @@
               <a:t>'y(t) and its derivatives'</a:t>
             </a:r>
             <a:r>
-              <a:rPr lang="en-US" sz="2800" dirty="0" smtClean="0">
+              <a:rPr lang="en-US" sz="1800" dirty="0" smtClean="0">
                 <a:solidFill>
                   <a:srgbClr val="000000"/>
                 </a:solidFill>
@@ -29493,10 +30211,13 @@
           </a:p>
           <a:p>
             <a:pPr algn="l" rtl="0">
-              <a:buNone/>
-            </a:pPr>
-            <a:r>
-              <a:rPr lang="en-US" sz="2800" dirty="0" smtClean="0">
+              <a:spcBef>
+                <a:spcPts val="0"/>
+              </a:spcBef>
+              <a:buNone/>
+            </a:pPr>
+            <a:r>
+              <a:rPr lang="en-US" sz="1800" dirty="0" smtClean="0">
                 <a:solidFill>
                   <a:srgbClr val="000000"/>
                 </a:solidFill>
@@ -29505,7 +30226,7 @@
               <a:t>legend(</a:t>
             </a:r>
             <a:r>
-              <a:rPr lang="en-US" sz="2800" dirty="0" smtClean="0">
+              <a:rPr lang="en-US" sz="1800" dirty="0" smtClean="0">
                 <a:solidFill>
                   <a:srgbClr val="A020F0"/>
                 </a:solidFill>
@@ -29514,7 +30235,7 @@
               <a:t>'y'</a:t>
             </a:r>
             <a:r>
-              <a:rPr lang="en-US" sz="2800" dirty="0" smtClean="0">
+              <a:rPr lang="en-US" sz="1800" dirty="0" smtClean="0">
                 <a:solidFill>
                   <a:srgbClr val="000000"/>
                 </a:solidFill>
@@ -29523,7 +30244,7 @@
               <a:t>,</a:t>
             </a:r>
             <a:r>
-              <a:rPr lang="en-US" sz="2800" dirty="0" smtClean="0">
+              <a:rPr lang="en-US" sz="1800" dirty="0" smtClean="0">
                 <a:solidFill>
                   <a:srgbClr val="A020F0"/>
                 </a:solidFill>
@@ -29532,7 +30253,7 @@
               <a:t>'dy/dt'</a:t>
             </a:r>
             <a:r>
-              <a:rPr lang="en-US" sz="2800" dirty="0" smtClean="0">
+              <a:rPr lang="en-US" sz="1800" dirty="0" smtClean="0">
                 <a:solidFill>
                   <a:srgbClr val="000000"/>
                 </a:solidFill>
@@ -29543,10 +30264,13 @@
           </a:p>
           <a:p>
             <a:pPr algn="l" rtl="0">
-              <a:buNone/>
-            </a:pPr>
-            <a:r>
-              <a:rPr lang="en-US" sz="2800" dirty="0" smtClean="0">
+              <a:spcBef>
+                <a:spcPts val="0"/>
+              </a:spcBef>
+              <a:buNone/>
+            </a:pPr>
+            <a:r>
+              <a:rPr lang="en-US" sz="1800" dirty="0" smtClean="0">
                 <a:solidFill>
                   <a:srgbClr val="000000"/>
                 </a:solidFill>
@@ -29557,10 +30281,13 @@
           </a:p>
           <a:p>
             <a:pPr algn="l" rtl="0">
-              <a:buNone/>
-            </a:pPr>
-            <a:r>
-              <a:rPr lang="en-US" sz="2800" dirty="0" smtClean="0">
+              <a:spcBef>
+                <a:spcPts val="0"/>
+              </a:spcBef>
+              <a:buNone/>
+            </a:pPr>
+            <a:r>
+              <a:rPr lang="en-US" sz="1800" dirty="0" smtClean="0">
                 <a:solidFill>
                   <a:srgbClr val="000000"/>
                 </a:solidFill>
@@ -29569,16 +30296,25 @@
               <a:t>ylabel(</a:t>
             </a:r>
             <a:r>
-              <a:rPr lang="en-US" sz="2800" dirty="0" smtClean="0">
+              <a:rPr lang="en-US" sz="1800" dirty="0">
                 <a:solidFill>
                   <a:srgbClr val="A020F0"/>
                 </a:solidFill>
                 <a:latin typeface="Courier New"/>
               </a:rPr>
-              <a:t>'volt/s^2‘</a:t>
-            </a:r>
-            <a:r>
-              <a:rPr lang="en-US" sz="2800" dirty="0" smtClean="0">
+              <a:t>'volt/s^2</a:t>
+            </a:r>
+            <a:r>
+              <a:rPr lang="en-US" sz="1800" dirty="0" smtClean="0">
+                <a:solidFill>
+                  <a:srgbClr val="A020F0"/>
+                </a:solidFill>
+                <a:latin typeface="Courier New"/>
+              </a:rPr>
+              <a:t>'</a:t>
+            </a:r>
+            <a:r>
+              <a:rPr lang="en-US" sz="1800" dirty="0" smtClean="0">
                 <a:solidFill>
                   <a:srgbClr val="000000"/>
                 </a:solidFill>
@@ -29586,6 +30322,12 @@
               </a:rPr>
               <a:t>)</a:t>
             </a:r>
+            <a:endParaRPr lang="en-US" sz="1800" dirty="0" smtClean="0">
+              <a:solidFill>
+                <a:srgbClr val="000000"/>
+              </a:solidFill>
+              <a:latin typeface="Courier New"/>
+            </a:endParaRPr>
           </a:p>
         </p:txBody>
       </p:sp>
@@ -29683,7 +30425,14 @@
                 <a:latin typeface="Courier New" pitchFamily="49" charset="0"/>
                 <a:cs typeface="Courier New" pitchFamily="49" charset="0"/>
               </a:rPr>
-              <a:t>&gt;&gt;k=[0:30];</a:t>
+              <a:t>&gt;&gt; k</a:t>
+            </a:r>
+            <a:r>
+              <a:rPr lang="en-US" sz="1800" dirty="0" smtClean="0">
+                <a:latin typeface="Courier New" pitchFamily="49" charset="0"/>
+                <a:cs typeface="Courier New" pitchFamily="49" charset="0"/>
+              </a:rPr>
+              <a:t>=[0:30];</a:t>
             </a:r>
           </a:p>
           <a:p>
@@ -29695,7 +30444,14 @@
                 <a:latin typeface="Courier New" pitchFamily="49" charset="0"/>
                 <a:cs typeface="Courier New" pitchFamily="49" charset="0"/>
               </a:rPr>
-              <a:t>&gt;&gt;x=sin(k/5);</a:t>
+              <a:t>&gt;&gt; x=sin(k/5</a:t>
+            </a:r>
+            <a:r>
+              <a:rPr lang="en-US" sz="1800" dirty="0" smtClean="0">
+                <a:latin typeface="Courier New" pitchFamily="49" charset="0"/>
+                <a:cs typeface="Courier New" pitchFamily="49" charset="0"/>
+              </a:rPr>
+              <a:t>);</a:t>
             </a:r>
           </a:p>
           <a:p>
@@ -29707,7 +30463,14 @@
                 <a:latin typeface="Courier New" pitchFamily="49" charset="0"/>
                 <a:cs typeface="Courier New" pitchFamily="49" charset="0"/>
               </a:rPr>
-              <a:t>&gt;&gt;stem(k,x)    or    stairs(k,x)</a:t>
+              <a:t>&gt;&gt; stem(k,x</a:t>
+            </a:r>
+            <a:r>
+              <a:rPr lang="en-US" sz="1800" dirty="0" smtClean="0">
+                <a:latin typeface="Courier New" pitchFamily="49" charset="0"/>
+                <a:cs typeface="Courier New" pitchFamily="49" charset="0"/>
+              </a:rPr>
+              <a:t>)    or    stairs(k,x)</a:t>
             </a:r>
           </a:p>
           <a:p>
@@ -30928,7 +31691,15 @@
           <a:p>
             <a:r>
               <a:rPr lang="he-IL" sz="2000" dirty="0" smtClean="0"/>
-              <a:t>יש להשלים את השורה בירוקה:</a:t>
+              <a:t>יש להשלים את השורה </a:t>
+            </a:r>
+            <a:r>
+              <a:rPr lang="he-IL" sz="2000" dirty="0" smtClean="0"/>
+              <a:t>הירוקה</a:t>
+            </a:r>
+            <a:r>
+              <a:rPr lang="he-IL" sz="2000" dirty="0" smtClean="0"/>
+              <a:t>:</a:t>
             </a:r>
           </a:p>
           <a:p>
@@ -31241,7 +32012,7 @@
           <a:graphicData uri="http://schemas.openxmlformats.org/presentationml/2006/ole">
             <mc:AlternateContent xmlns:mc="http://schemas.openxmlformats.org/markup-compatibility/2006">
               <mc:Choice xmlns:v="urn:schemas-microsoft-com:vml" Requires="v">
-                <p:oleObj spid="_x0000_s95245" name="Equation" r:id="rId3" imgW="850531" imgH="253890" progId="Equation.DSMT4">
+                <p:oleObj spid="_x0000_s95250" name="Equation" r:id="rId3" imgW="850531" imgH="253890" progId="Equation.DSMT4">
                   <p:embed/>
                 </p:oleObj>
               </mc:Choice>
@@ -34849,7 +35620,7 @@
           <a:graphicData uri="http://schemas.openxmlformats.org/presentationml/2006/ole">
             <mc:AlternateContent xmlns:mc="http://schemas.openxmlformats.org/markup-compatibility/2006">
               <mc:Choice xmlns:v="urn:schemas-microsoft-com:vml" Requires="v">
-                <p:oleObj spid="_x0000_s109593" name="Equation" r:id="rId3" imgW="710891" imgH="266584" progId="Equation.DSMT4">
+                <p:oleObj spid="_x0000_s109601" name="Equation" r:id="rId3" imgW="710891" imgH="266584" progId="Equation.DSMT4">
                   <p:embed/>
                 </p:oleObj>
               </mc:Choice>
@@ -34957,7 +35728,7 @@
           <a:graphicData uri="http://schemas.openxmlformats.org/presentationml/2006/ole">
             <mc:AlternateContent xmlns:mc="http://schemas.openxmlformats.org/markup-compatibility/2006">
               <mc:Choice xmlns:v="urn:schemas-microsoft-com:vml" Requires="v">
-                <p:oleObj spid="_x0000_s109594" name="Equation" r:id="rId5" imgW="1256755" imgH="482391" progId="Equation.DSMT4">
+                <p:oleObj spid="_x0000_s109602" name="Equation" r:id="rId5" imgW="1256755" imgH="482391" progId="Equation.DSMT4">
                   <p:embed/>
                 </p:oleObj>
               </mc:Choice>
@@ -35396,7 +36167,7 @@
           <a:graphicData uri="http://schemas.openxmlformats.org/presentationml/2006/ole">
             <mc:AlternateContent xmlns:mc="http://schemas.openxmlformats.org/markup-compatibility/2006">
               <mc:Choice xmlns:v="urn:schemas-microsoft-com:vml" Requires="v">
-                <p:oleObj spid="_x0000_s140378" name="Equation" r:id="rId3" imgW="1256755" imgH="253890" progId="Equation.DSMT4">
+                <p:oleObj spid="_x0000_s140406" name="Equation" r:id="rId3" imgW="1256755" imgH="253890" progId="Equation.DSMT4">
                   <p:embed/>
                 </p:oleObj>
               </mc:Choice>
@@ -35542,7 +36313,7 @@
           <a:graphicData uri="http://schemas.openxmlformats.org/presentationml/2006/ole">
             <mc:AlternateContent xmlns:mc="http://schemas.openxmlformats.org/markup-compatibility/2006">
               <mc:Choice xmlns:v="urn:schemas-microsoft-com:vml" Requires="v">
-                <p:oleObj spid="_x0000_s140379" name="Equation" r:id="rId5" imgW="1129810" imgH="253890" progId="Equation.DSMT4">
+                <p:oleObj spid="_x0000_s140407" name="Equation" r:id="rId5" imgW="1129810" imgH="253890" progId="Equation.DSMT4">
                   <p:embed/>
                 </p:oleObj>
               </mc:Choice>
@@ -35688,7 +36459,7 @@
           <a:graphicData uri="http://schemas.openxmlformats.org/presentationml/2006/ole">
             <mc:AlternateContent xmlns:mc="http://schemas.openxmlformats.org/markup-compatibility/2006">
               <mc:Choice xmlns:v="urn:schemas-microsoft-com:vml" Requires="v">
-                <p:oleObj spid="_x0000_s140380" name="Equation" r:id="rId7" imgW="469696" imgH="177723" progId="Equation.DSMT4">
+                <p:oleObj spid="_x0000_s140408" name="Equation" r:id="rId7" imgW="469696" imgH="177723" progId="Equation.DSMT4">
                   <p:embed/>
                 </p:oleObj>
               </mc:Choice>
@@ -35834,7 +36605,7 @@
           <a:graphicData uri="http://schemas.openxmlformats.org/presentationml/2006/ole">
             <mc:AlternateContent xmlns:mc="http://schemas.openxmlformats.org/markup-compatibility/2006">
               <mc:Choice xmlns:v="urn:schemas-microsoft-com:vml" Requires="v">
-                <p:oleObj spid="_x0000_s140381" name="Equation" r:id="rId9" imgW="710891" imgH="266584" progId="Equation.DSMT4">
+                <p:oleObj spid="_x0000_s140409" name="Equation" r:id="rId9" imgW="710891" imgH="266584" progId="Equation.DSMT4">
                   <p:embed/>
                 </p:oleObj>
               </mc:Choice>
@@ -35980,7 +36751,7 @@
           <a:graphicData uri="http://schemas.openxmlformats.org/presentationml/2006/ole">
             <mc:AlternateContent xmlns:mc="http://schemas.openxmlformats.org/markup-compatibility/2006">
               <mc:Choice xmlns:v="urn:schemas-microsoft-com:vml" Requires="v">
-                <p:oleObj spid="_x0000_s140382" name="Equation" r:id="rId11" imgW="850900" imgH="228600" progId="Equation.DSMT4">
+                <p:oleObj spid="_x0000_s140410" name="Equation" r:id="rId11" imgW="850900" imgH="228600" progId="Equation.DSMT4">
                   <p:embed/>
                 </p:oleObj>
               </mc:Choice>
@@ -36126,7 +36897,7 @@
           <a:graphicData uri="http://schemas.openxmlformats.org/presentationml/2006/ole">
             <mc:AlternateContent xmlns:mc="http://schemas.openxmlformats.org/markup-compatibility/2006">
               <mc:Choice xmlns:v="urn:schemas-microsoft-com:vml" Requires="v">
-                <p:oleObj spid="_x0000_s140383" name="Equation" r:id="rId13" imgW="1803400" imgH="508000" progId="Equation.DSMT4">
+                <p:oleObj spid="_x0000_s140411" name="Equation" r:id="rId13" imgW="1803400" imgH="508000" progId="Equation.DSMT4">
                   <p:embed/>
                 </p:oleObj>
               </mc:Choice>
@@ -36272,7 +37043,7 @@
           <a:graphicData uri="http://schemas.openxmlformats.org/presentationml/2006/ole">
             <mc:AlternateContent xmlns:mc="http://schemas.openxmlformats.org/markup-compatibility/2006">
               <mc:Choice xmlns:v="urn:schemas-microsoft-com:vml" Requires="v">
-                <p:oleObj spid="_x0000_s140384" name="Equation" r:id="rId15" imgW="126780" imgH="215526" progId="Equation.DSMT4">
+                <p:oleObj spid="_x0000_s140412" name="Equation" r:id="rId15" imgW="126780" imgH="215526" progId="Equation.DSMT4">
                   <p:embed/>
                 </p:oleObj>
               </mc:Choice>
@@ -36833,7 +37604,7 @@
           <a:graphicData uri="http://schemas.openxmlformats.org/presentationml/2006/ole">
             <mc:AlternateContent xmlns:mc="http://schemas.openxmlformats.org/markup-compatibility/2006">
               <mc:Choice xmlns:v="urn:schemas-microsoft-com:vml" Requires="v">
-                <p:oleObj spid="_x0000_s108571" name="Equation" r:id="rId3" imgW="1205977" imgH="393529" progId="Equation.DSMT4">
+                <p:oleObj spid="_x0000_s108579" name="Equation" r:id="rId3" imgW="1205977" imgH="393529" progId="Equation.DSMT4">
                   <p:embed/>
                 </p:oleObj>
               </mc:Choice>
@@ -37012,7 +37783,7 @@
           <a:graphicData uri="http://schemas.openxmlformats.org/presentationml/2006/ole">
             <mc:AlternateContent xmlns:mc="http://schemas.openxmlformats.org/markup-compatibility/2006">
               <mc:Choice xmlns:v="urn:schemas-microsoft-com:vml" Requires="v">
-                <p:oleObj spid="_x0000_s108572" name="Equation" r:id="rId6" imgW="825500" imgH="393700" progId="Equation.DSMT4">
+                <p:oleObj spid="_x0000_s108580" name="Equation" r:id="rId6" imgW="825500" imgH="393700" progId="Equation.DSMT4">
                   <p:embed/>
                 </p:oleObj>
               </mc:Choice>

</xml_diff>